<commit_message>
ajout des WS getAll pour l'écran test
</commit_message>
<xml_diff>
--- a/src/main/resources/mq.pptx
+++ b/src/main/resources/mq.pptx
@@ -8,6 +8,7 @@
     <p:sldId id="256" r:id="rId2"/>
     <p:sldId id="257" r:id="rId3"/>
     <p:sldId id="258" r:id="rId4"/>
+    <p:sldId id="259" r:id="rId5"/>
   </p:sldIdLst>
   <p:sldSz cx="9144000" cy="6858000" type="screen4x3"/>
   <p:notesSz cx="6858000" cy="9144000"/>
@@ -304,7 +305,7 @@
           <a:p>
             <a:fld id="{1DDB72BE-B427-4A6F-AFFD-AFAC62060F46}" type="datetimeFigureOut">
               <a:rPr lang="fr-FR" smtClean="0"/>
-              <a:t>17/02/2020</a:t>
+              <a:t>29/03/2020</a:t>
             </a:fld>
             <a:endParaRPr lang="fr-FR"/>
           </a:p>
@@ -472,7 +473,7 @@
           <a:p>
             <a:fld id="{1DDB72BE-B427-4A6F-AFFD-AFAC62060F46}" type="datetimeFigureOut">
               <a:rPr lang="fr-FR" smtClean="0"/>
-              <a:t>17/02/2020</a:t>
+              <a:t>29/03/2020</a:t>
             </a:fld>
             <a:endParaRPr lang="fr-FR"/>
           </a:p>
@@ -650,7 +651,7 @@
           <a:p>
             <a:fld id="{1DDB72BE-B427-4A6F-AFFD-AFAC62060F46}" type="datetimeFigureOut">
               <a:rPr lang="fr-FR" smtClean="0"/>
-              <a:t>17/02/2020</a:t>
+              <a:t>29/03/2020</a:t>
             </a:fld>
             <a:endParaRPr lang="fr-FR"/>
           </a:p>
@@ -818,7 +819,7 @@
           <a:p>
             <a:fld id="{1DDB72BE-B427-4A6F-AFFD-AFAC62060F46}" type="datetimeFigureOut">
               <a:rPr lang="fr-FR" smtClean="0"/>
-              <a:t>17/02/2020</a:t>
+              <a:t>29/03/2020</a:t>
             </a:fld>
             <a:endParaRPr lang="fr-FR"/>
           </a:p>
@@ -1063,7 +1064,7 @@
           <a:p>
             <a:fld id="{1DDB72BE-B427-4A6F-AFFD-AFAC62060F46}" type="datetimeFigureOut">
               <a:rPr lang="fr-FR" smtClean="0"/>
-              <a:t>17/02/2020</a:t>
+              <a:t>29/03/2020</a:t>
             </a:fld>
             <a:endParaRPr lang="fr-FR"/>
           </a:p>
@@ -1348,7 +1349,7 @@
           <a:p>
             <a:fld id="{1DDB72BE-B427-4A6F-AFFD-AFAC62060F46}" type="datetimeFigureOut">
               <a:rPr lang="fr-FR" smtClean="0"/>
-              <a:t>17/02/2020</a:t>
+              <a:t>29/03/2020</a:t>
             </a:fld>
             <a:endParaRPr lang="fr-FR"/>
           </a:p>
@@ -1767,7 +1768,7 @@
           <a:p>
             <a:fld id="{1DDB72BE-B427-4A6F-AFFD-AFAC62060F46}" type="datetimeFigureOut">
               <a:rPr lang="fr-FR" smtClean="0"/>
-              <a:t>17/02/2020</a:t>
+              <a:t>29/03/2020</a:t>
             </a:fld>
             <a:endParaRPr lang="fr-FR"/>
           </a:p>
@@ -1884,7 +1885,7 @@
           <a:p>
             <a:fld id="{1DDB72BE-B427-4A6F-AFFD-AFAC62060F46}" type="datetimeFigureOut">
               <a:rPr lang="fr-FR" smtClean="0"/>
-              <a:t>17/02/2020</a:t>
+              <a:t>29/03/2020</a:t>
             </a:fld>
             <a:endParaRPr lang="fr-FR"/>
           </a:p>
@@ -1979,7 +1980,7 @@
           <a:p>
             <a:fld id="{1DDB72BE-B427-4A6F-AFFD-AFAC62060F46}" type="datetimeFigureOut">
               <a:rPr lang="fr-FR" smtClean="0"/>
-              <a:t>17/02/2020</a:t>
+              <a:t>29/03/2020</a:t>
             </a:fld>
             <a:endParaRPr lang="fr-FR"/>
           </a:p>
@@ -2254,7 +2255,7 @@
           <a:p>
             <a:fld id="{1DDB72BE-B427-4A6F-AFFD-AFAC62060F46}" type="datetimeFigureOut">
               <a:rPr lang="fr-FR" smtClean="0"/>
-              <a:t>17/02/2020</a:t>
+              <a:t>29/03/2020</a:t>
             </a:fld>
             <a:endParaRPr lang="fr-FR"/>
           </a:p>
@@ -2506,7 +2507,7 @@
           <a:p>
             <a:fld id="{1DDB72BE-B427-4A6F-AFFD-AFAC62060F46}" type="datetimeFigureOut">
               <a:rPr lang="fr-FR" smtClean="0"/>
-              <a:t>17/02/2020</a:t>
+              <a:t>29/03/2020</a:t>
             </a:fld>
             <a:endParaRPr lang="fr-FR"/>
           </a:p>
@@ -2717,7 +2718,7 @@
           <a:p>
             <a:fld id="{1DDB72BE-B427-4A6F-AFFD-AFAC62060F46}" type="datetimeFigureOut">
               <a:rPr lang="fr-FR" smtClean="0"/>
-              <a:t>17/02/2020</a:t>
+              <a:t>29/03/2020</a:t>
             </a:fld>
             <a:endParaRPr lang="fr-FR"/>
           </a:p>
@@ -4986,6 +4987,1048 @@
 </p:sld>
 </file>
 
+<file path=ppt/slides/slide4.xml><?xml version="1.0" encoding="utf-8"?>
+<p:sld xmlns:a="http://schemas.openxmlformats.org/drawingml/2006/main" xmlns:r="http://schemas.openxmlformats.org/officeDocument/2006/relationships" xmlns:p="http://schemas.openxmlformats.org/presentationml/2006/main">
+  <p:cSld>
+    <p:spTree>
+      <p:nvGrpSpPr>
+        <p:cNvPr id="1" name=""/>
+        <p:cNvGrpSpPr/>
+        <p:nvPr/>
+      </p:nvGrpSpPr>
+      <p:grpSpPr>
+        <a:xfrm>
+          <a:off x="0" y="0"/>
+          <a:ext cx="0" cy="0"/>
+          <a:chOff x="0" y="0"/>
+          <a:chExt cx="0" cy="0"/>
+        </a:xfrm>
+      </p:grpSpPr>
+      <p:graphicFrame>
+        <p:nvGraphicFramePr>
+          <p:cNvPr id="6" name="Tableau 5"/>
+          <p:cNvGraphicFramePr>
+            <a:graphicFrameLocks noGrp="1"/>
+          </p:cNvGraphicFramePr>
+          <p:nvPr>
+            <p:extLst>
+              <p:ext uri="{D42A27DB-BD31-4B8C-83A1-F6EECF244321}">
+                <p14:modId xmlns:p14="http://schemas.microsoft.com/office/powerpoint/2010/main" val="3189300809"/>
+              </p:ext>
+            </p:extLst>
+          </p:nvPr>
+        </p:nvGraphicFramePr>
+        <p:xfrm>
+          <a:off x="4932040" y="1397000"/>
+          <a:ext cx="3960440" cy="3053080"/>
+        </p:xfrm>
+        <a:graphic>
+          <a:graphicData uri="http://schemas.openxmlformats.org/drawingml/2006/table">
+            <a:tbl>
+              <a:tblPr firstRow="1" bandRow="1">
+                <a:tableStyleId>{5940675A-B579-460E-94D1-54222C63F5DA}</a:tableStyleId>
+              </a:tblPr>
+              <a:tblGrid>
+                <a:gridCol w="720080">
+                  <a:extLst>
+                    <a:ext uri="{9D8B030D-6E8A-4147-A177-3AD203B41FA5}">
+                      <a16:colId xmlns:a16="http://schemas.microsoft.com/office/drawing/2014/main" val="20000"/>
+                    </a:ext>
+                  </a:extLst>
+                </a:gridCol>
+                <a:gridCol w="3240360">
+                  <a:extLst>
+                    <a:ext uri="{9D8B030D-6E8A-4147-A177-3AD203B41FA5}">
+                      <a16:colId xmlns:a16="http://schemas.microsoft.com/office/drawing/2014/main" val="20001"/>
+                    </a:ext>
+                  </a:extLst>
+                </a:gridCol>
+              </a:tblGrid>
+              <a:tr h="370840">
+                <a:tc>
+                  <a:txBody>
+                    <a:bodyPr/>
+                    <a:lstStyle/>
+                    <a:p>
+                      <a:r>
+                        <a:rPr lang="fr-FR" sz="1200" dirty="0"/>
+                        <a:t>V1.0</a:t>
+                      </a:r>
+                    </a:p>
+                  </a:txBody>
+                  <a:tcPr/>
+                </a:tc>
+                <a:tc>
+                  <a:txBody>
+                    <a:bodyPr/>
+                    <a:lstStyle/>
+                    <a:p>
+                      <a:pPr marL="0" marR="0" indent="0" algn="l" defTabSz="914400" rtl="0" eaLnBrk="1" fontAlgn="auto" latinLnBrk="0" hangingPunct="1">
+                        <a:lnSpc>
+                          <a:spcPct val="100000"/>
+                        </a:lnSpc>
+                        <a:spcBef>
+                          <a:spcPts val="0"/>
+                        </a:spcBef>
+                        <a:spcAft>
+                          <a:spcPts val="0"/>
+                        </a:spcAft>
+                        <a:buClrTx/>
+                        <a:buSzTx/>
+                        <a:buFontTx/>
+                        <a:buNone/>
+                        <a:tabLst/>
+                        <a:defRPr/>
+                      </a:pPr>
+                      <a:r>
+                        <a:rPr lang="fr-FR" sz="1200" dirty="0"/>
+                        <a:t>T007 – Création de l’écran test</a:t>
+                      </a:r>
+                    </a:p>
+                    <a:p>
+                      <a:endParaRPr lang="fr-FR" sz="1200" dirty="0"/>
+                    </a:p>
+                  </a:txBody>
+                  <a:tcPr/>
+                </a:tc>
+                <a:extLst>
+                  <a:ext uri="{0D108BD9-81ED-4DB2-BD59-A6C34878D82A}">
+                    <a16:rowId xmlns:a16="http://schemas.microsoft.com/office/drawing/2014/main" val="10000"/>
+                  </a:ext>
+                </a:extLst>
+              </a:tr>
+              <a:tr h="370840">
+                <a:tc>
+                  <a:txBody>
+                    <a:bodyPr/>
+                    <a:lstStyle/>
+                    <a:p>
+                      <a:endParaRPr lang="fr-FR" sz="1200"/>
+                    </a:p>
+                  </a:txBody>
+                  <a:tcPr/>
+                </a:tc>
+                <a:tc>
+                  <a:txBody>
+                    <a:bodyPr/>
+                    <a:lstStyle/>
+                    <a:p>
+                      <a:endParaRPr lang="fr-FR" sz="1200"/>
+                    </a:p>
+                  </a:txBody>
+                  <a:tcPr/>
+                </a:tc>
+                <a:extLst>
+                  <a:ext uri="{0D108BD9-81ED-4DB2-BD59-A6C34878D82A}">
+                    <a16:rowId xmlns:a16="http://schemas.microsoft.com/office/drawing/2014/main" val="10001"/>
+                  </a:ext>
+                </a:extLst>
+              </a:tr>
+              <a:tr h="370840">
+                <a:tc>
+                  <a:txBody>
+                    <a:bodyPr/>
+                    <a:lstStyle/>
+                    <a:p>
+                      <a:endParaRPr lang="fr-FR" sz="1200"/>
+                    </a:p>
+                  </a:txBody>
+                  <a:tcPr/>
+                </a:tc>
+                <a:tc>
+                  <a:txBody>
+                    <a:bodyPr/>
+                    <a:lstStyle/>
+                    <a:p>
+                      <a:endParaRPr lang="fr-FR" sz="1200"/>
+                    </a:p>
+                  </a:txBody>
+                  <a:tcPr/>
+                </a:tc>
+                <a:extLst>
+                  <a:ext uri="{0D108BD9-81ED-4DB2-BD59-A6C34878D82A}">
+                    <a16:rowId xmlns:a16="http://schemas.microsoft.com/office/drawing/2014/main" val="10002"/>
+                  </a:ext>
+                </a:extLst>
+              </a:tr>
+              <a:tr h="370840">
+                <a:tc>
+                  <a:txBody>
+                    <a:bodyPr/>
+                    <a:lstStyle/>
+                    <a:p>
+                      <a:endParaRPr lang="fr-FR" sz="1200"/>
+                    </a:p>
+                  </a:txBody>
+                  <a:tcPr/>
+                </a:tc>
+                <a:tc>
+                  <a:txBody>
+                    <a:bodyPr/>
+                    <a:lstStyle/>
+                    <a:p>
+                      <a:endParaRPr lang="fr-FR" sz="1200"/>
+                    </a:p>
+                  </a:txBody>
+                  <a:tcPr/>
+                </a:tc>
+                <a:extLst>
+                  <a:ext uri="{0D108BD9-81ED-4DB2-BD59-A6C34878D82A}">
+                    <a16:rowId xmlns:a16="http://schemas.microsoft.com/office/drawing/2014/main" val="10003"/>
+                  </a:ext>
+                </a:extLst>
+              </a:tr>
+              <a:tr h="370840">
+                <a:tc>
+                  <a:txBody>
+                    <a:bodyPr/>
+                    <a:lstStyle/>
+                    <a:p>
+                      <a:endParaRPr lang="fr-FR" sz="1200"/>
+                    </a:p>
+                  </a:txBody>
+                  <a:tcPr/>
+                </a:tc>
+                <a:tc>
+                  <a:txBody>
+                    <a:bodyPr/>
+                    <a:lstStyle/>
+                    <a:p>
+                      <a:endParaRPr lang="fr-FR" sz="1200"/>
+                    </a:p>
+                  </a:txBody>
+                  <a:tcPr/>
+                </a:tc>
+                <a:extLst>
+                  <a:ext uri="{0D108BD9-81ED-4DB2-BD59-A6C34878D82A}">
+                    <a16:rowId xmlns:a16="http://schemas.microsoft.com/office/drawing/2014/main" val="10004"/>
+                  </a:ext>
+                </a:extLst>
+              </a:tr>
+              <a:tr h="370840">
+                <a:tc>
+                  <a:txBody>
+                    <a:bodyPr/>
+                    <a:lstStyle/>
+                    <a:p>
+                      <a:endParaRPr lang="fr-FR" sz="1200"/>
+                    </a:p>
+                  </a:txBody>
+                  <a:tcPr/>
+                </a:tc>
+                <a:tc>
+                  <a:txBody>
+                    <a:bodyPr/>
+                    <a:lstStyle/>
+                    <a:p>
+                      <a:endParaRPr lang="fr-FR" sz="1200"/>
+                    </a:p>
+                  </a:txBody>
+                  <a:tcPr/>
+                </a:tc>
+                <a:extLst>
+                  <a:ext uri="{0D108BD9-81ED-4DB2-BD59-A6C34878D82A}">
+                    <a16:rowId xmlns:a16="http://schemas.microsoft.com/office/drawing/2014/main" val="10005"/>
+                  </a:ext>
+                </a:extLst>
+              </a:tr>
+              <a:tr h="370840">
+                <a:tc>
+                  <a:txBody>
+                    <a:bodyPr/>
+                    <a:lstStyle/>
+                    <a:p>
+                      <a:endParaRPr lang="fr-FR" sz="1200"/>
+                    </a:p>
+                  </a:txBody>
+                  <a:tcPr/>
+                </a:tc>
+                <a:tc>
+                  <a:txBody>
+                    <a:bodyPr/>
+                    <a:lstStyle/>
+                    <a:p>
+                      <a:endParaRPr lang="fr-FR" sz="1200"/>
+                    </a:p>
+                  </a:txBody>
+                  <a:tcPr/>
+                </a:tc>
+                <a:extLst>
+                  <a:ext uri="{0D108BD9-81ED-4DB2-BD59-A6C34878D82A}">
+                    <a16:rowId xmlns:a16="http://schemas.microsoft.com/office/drawing/2014/main" val="10006"/>
+                  </a:ext>
+                </a:extLst>
+              </a:tr>
+              <a:tr h="370840">
+                <a:tc>
+                  <a:txBody>
+                    <a:bodyPr/>
+                    <a:lstStyle/>
+                    <a:p>
+                      <a:endParaRPr lang="fr-FR" sz="1200"/>
+                    </a:p>
+                  </a:txBody>
+                  <a:tcPr/>
+                </a:tc>
+                <a:tc>
+                  <a:txBody>
+                    <a:bodyPr/>
+                    <a:lstStyle/>
+                    <a:p>
+                      <a:endParaRPr lang="fr-FR" sz="1200" dirty="0"/>
+                    </a:p>
+                  </a:txBody>
+                  <a:tcPr/>
+                </a:tc>
+                <a:extLst>
+                  <a:ext uri="{0D108BD9-81ED-4DB2-BD59-A6C34878D82A}">
+                    <a16:rowId xmlns:a16="http://schemas.microsoft.com/office/drawing/2014/main" val="10007"/>
+                  </a:ext>
+                </a:extLst>
+              </a:tr>
+            </a:tbl>
+          </a:graphicData>
+        </a:graphic>
+      </p:graphicFrame>
+      <p:sp>
+        <p:nvSpPr>
+          <p:cNvPr id="10" name="ZoneTexte 9">
+            <a:extLst>
+              <a:ext uri="{FF2B5EF4-FFF2-40B4-BE49-F238E27FC236}">
+                <a16:creationId xmlns:a16="http://schemas.microsoft.com/office/drawing/2014/main" id="{B08D4C3C-8EAE-49D8-A58A-BE3C4E499318}"/>
+              </a:ext>
+            </a:extLst>
+          </p:cNvPr>
+          <p:cNvSpPr txBox="1"/>
+          <p:nvPr/>
+        </p:nvSpPr>
+        <p:spPr>
+          <a:xfrm>
+            <a:off x="5220072" y="260648"/>
+            <a:ext cx="2808312" cy="369332"/>
+          </a:xfrm>
+          <a:prstGeom prst="rect">
+            <a:avLst/>
+          </a:prstGeom>
+          <a:noFill/>
+        </p:spPr>
+        <p:txBody>
+          <a:bodyPr wrap="square" rtlCol="0">
+            <a:spAutoFit/>
+          </a:bodyPr>
+          <a:lstStyle/>
+          <a:p>
+            <a:r>
+              <a:rPr lang="fr-FR" dirty="0"/>
+              <a:t>Ecran erreur</a:t>
+            </a:r>
+          </a:p>
+        </p:txBody>
+      </p:sp>
+      <p:grpSp>
+        <p:nvGrpSpPr>
+          <p:cNvPr id="19" name="Groupe 18">
+            <a:extLst>
+              <a:ext uri="{FF2B5EF4-FFF2-40B4-BE49-F238E27FC236}">
+                <a16:creationId xmlns:a16="http://schemas.microsoft.com/office/drawing/2014/main" id="{25BF64D1-B1E4-42B9-B7BD-299AE6461F9D}"/>
+              </a:ext>
+            </a:extLst>
+          </p:cNvPr>
+          <p:cNvGrpSpPr/>
+          <p:nvPr/>
+        </p:nvGrpSpPr>
+        <p:grpSpPr>
+          <a:xfrm>
+            <a:off x="755576" y="728700"/>
+            <a:ext cx="3960440" cy="5400600"/>
+            <a:chOff x="755576" y="728700"/>
+            <a:chExt cx="3960440" cy="5400600"/>
+          </a:xfrm>
+        </p:grpSpPr>
+        <p:grpSp>
+          <p:nvGrpSpPr>
+            <p:cNvPr id="5" name="Groupe 4">
+              <a:extLst>
+                <a:ext uri="{FF2B5EF4-FFF2-40B4-BE49-F238E27FC236}">
+                  <a16:creationId xmlns:a16="http://schemas.microsoft.com/office/drawing/2014/main" id="{52E4449B-6918-45D2-9AA4-7C3B1B5DFE50}"/>
+                </a:ext>
+              </a:extLst>
+            </p:cNvPr>
+            <p:cNvGrpSpPr/>
+            <p:nvPr/>
+          </p:nvGrpSpPr>
+          <p:grpSpPr>
+            <a:xfrm>
+              <a:off x="755576" y="728700"/>
+              <a:ext cx="3960440" cy="5400600"/>
+              <a:chOff x="755576" y="728700"/>
+              <a:chExt cx="3960440" cy="5400600"/>
+            </a:xfrm>
+          </p:grpSpPr>
+          <p:grpSp>
+            <p:nvGrpSpPr>
+              <p:cNvPr id="9" name="Groupe 8"/>
+              <p:cNvGrpSpPr/>
+              <p:nvPr/>
+            </p:nvGrpSpPr>
+            <p:grpSpPr>
+              <a:xfrm>
+                <a:off x="755576" y="728700"/>
+                <a:ext cx="3960440" cy="5400600"/>
+                <a:chOff x="755576" y="728700"/>
+                <a:chExt cx="3960440" cy="5400600"/>
+              </a:xfrm>
+            </p:grpSpPr>
+            <p:sp>
+              <p:nvSpPr>
+                <p:cNvPr id="4" name="Rectangle 3"/>
+                <p:cNvSpPr/>
+                <p:nvPr/>
+              </p:nvSpPr>
+              <p:spPr>
+                <a:xfrm>
+                  <a:off x="755576" y="728700"/>
+                  <a:ext cx="3960440" cy="5400600"/>
+                </a:xfrm>
+                <a:prstGeom prst="rect">
+                  <a:avLst/>
+                </a:prstGeom>
+                <a:ln>
+                  <a:solidFill>
+                    <a:schemeClr val="tx1"/>
+                  </a:solidFill>
+                </a:ln>
+              </p:spPr>
+              <p:style>
+                <a:lnRef idx="2">
+                  <a:schemeClr val="accent1">
+                    <a:shade val="50000"/>
+                  </a:schemeClr>
+                </a:lnRef>
+                <a:fillRef idx="1">
+                  <a:schemeClr val="accent1"/>
+                </a:fillRef>
+                <a:effectRef idx="0">
+                  <a:schemeClr val="accent1"/>
+                </a:effectRef>
+                <a:fontRef idx="minor">
+                  <a:schemeClr val="lt1"/>
+                </a:fontRef>
+              </p:style>
+              <p:txBody>
+                <a:bodyPr rtlCol="0" anchor="ctr"/>
+                <a:lstStyle/>
+                <a:p>
+                  <a:pPr algn="ctr"/>
+                  <a:endParaRPr lang="fr-FR"/>
+                </a:p>
+              </p:txBody>
+            </p:sp>
+            <p:sp>
+              <p:nvSpPr>
+                <p:cNvPr id="7" name="Rectangle 6"/>
+                <p:cNvSpPr/>
+                <p:nvPr/>
+              </p:nvSpPr>
+              <p:spPr>
+                <a:xfrm>
+                  <a:off x="755576" y="728700"/>
+                  <a:ext cx="3960440" cy="468052"/>
+                </a:xfrm>
+                <a:prstGeom prst="rect">
+                  <a:avLst/>
+                </a:prstGeom>
+                <a:solidFill>
+                  <a:schemeClr val="bg1"/>
+                </a:solidFill>
+                <a:ln>
+                  <a:solidFill>
+                    <a:schemeClr val="tx1"/>
+                  </a:solidFill>
+                </a:ln>
+              </p:spPr>
+              <p:style>
+                <a:lnRef idx="2">
+                  <a:schemeClr val="accent1">
+                    <a:shade val="50000"/>
+                  </a:schemeClr>
+                </a:lnRef>
+                <a:fillRef idx="1">
+                  <a:schemeClr val="accent1"/>
+                </a:fillRef>
+                <a:effectRef idx="0">
+                  <a:schemeClr val="accent1"/>
+                </a:effectRef>
+                <a:fontRef idx="minor">
+                  <a:schemeClr val="lt1"/>
+                </a:fontRef>
+              </p:style>
+              <p:txBody>
+                <a:bodyPr rtlCol="0" anchor="ctr"/>
+                <a:lstStyle/>
+                <a:p>
+                  <a:pPr algn="ctr"/>
+                  <a:endParaRPr lang="fr-FR"/>
+                </a:p>
+              </p:txBody>
+            </p:sp>
+            <p:sp>
+              <p:nvSpPr>
+                <p:cNvPr id="8" name="ZoneTexte 7"/>
+                <p:cNvSpPr txBox="1"/>
+                <p:nvPr/>
+              </p:nvSpPr>
+              <p:spPr>
+                <a:xfrm>
+                  <a:off x="755576" y="824226"/>
+                  <a:ext cx="936104" cy="276999"/>
+                </a:xfrm>
+                <a:prstGeom prst="rect">
+                  <a:avLst/>
+                </a:prstGeom>
+                <a:noFill/>
+              </p:spPr>
+              <p:txBody>
+                <a:bodyPr wrap="square" rtlCol="0">
+                  <a:spAutoFit/>
+                </a:bodyPr>
+                <a:lstStyle/>
+                <a:p>
+                  <a:pPr algn="ctr"/>
+                  <a:r>
+                    <a:rPr lang="fr-FR" sz="1200" dirty="0"/>
+                    <a:t>Accueil</a:t>
+                  </a:r>
+                </a:p>
+              </p:txBody>
+            </p:sp>
+          </p:grpSp>
+          <p:sp>
+            <p:nvSpPr>
+              <p:cNvPr id="2" name="Rectangle 1">
+                <a:extLst>
+                  <a:ext uri="{FF2B5EF4-FFF2-40B4-BE49-F238E27FC236}">
+                    <a16:creationId xmlns:a16="http://schemas.microsoft.com/office/drawing/2014/main" id="{8D0CE8A9-91AE-41BA-8A79-CAD11D04711F}"/>
+                  </a:ext>
+                </a:extLst>
+              </p:cNvPr>
+              <p:cNvSpPr/>
+              <p:nvPr/>
+            </p:nvSpPr>
+            <p:spPr>
+              <a:xfrm>
+                <a:off x="899592" y="1397000"/>
+                <a:ext cx="3672408" cy="4480272"/>
+              </a:xfrm>
+              <a:prstGeom prst="rect">
+                <a:avLst/>
+              </a:prstGeom>
+              <a:solidFill>
+                <a:schemeClr val="bg1"/>
+              </a:solidFill>
+              <a:ln>
+                <a:solidFill>
+                  <a:schemeClr val="tx1">
+                    <a:lumMod val="95000"/>
+                    <a:lumOff val="5000"/>
+                  </a:schemeClr>
+                </a:solidFill>
+              </a:ln>
+            </p:spPr>
+            <p:style>
+              <a:lnRef idx="2">
+                <a:schemeClr val="accent1">
+                  <a:shade val="50000"/>
+                </a:schemeClr>
+              </a:lnRef>
+              <a:fillRef idx="1">
+                <a:schemeClr val="accent1"/>
+              </a:fillRef>
+              <a:effectRef idx="0">
+                <a:schemeClr val="accent1"/>
+              </a:effectRef>
+              <a:fontRef idx="minor">
+                <a:schemeClr val="lt1"/>
+              </a:fontRef>
+            </p:style>
+            <p:txBody>
+              <a:bodyPr rtlCol="0" anchor="ctr"/>
+              <a:lstStyle/>
+              <a:p>
+                <a:pPr algn="ctr"/>
+                <a:endParaRPr lang="fr-FR"/>
+              </a:p>
+            </p:txBody>
+          </p:sp>
+          <p:sp>
+            <p:nvSpPr>
+              <p:cNvPr id="3" name="ZoneTexte 2">
+                <a:extLst>
+                  <a:ext uri="{FF2B5EF4-FFF2-40B4-BE49-F238E27FC236}">
+                    <a16:creationId xmlns:a16="http://schemas.microsoft.com/office/drawing/2014/main" id="{4BF9D852-A74C-448B-B927-A15B97881A76}"/>
+                  </a:ext>
+                </a:extLst>
+              </p:cNvPr>
+              <p:cNvSpPr txBox="1"/>
+              <p:nvPr/>
+            </p:nvSpPr>
+            <p:spPr>
+              <a:xfrm>
+                <a:off x="881832" y="2176344"/>
+                <a:ext cx="3240360" cy="400110"/>
+              </a:xfrm>
+              <a:prstGeom prst="rect">
+                <a:avLst/>
+              </a:prstGeom>
+              <a:noFill/>
+            </p:spPr>
+            <p:txBody>
+              <a:bodyPr wrap="square" rtlCol="0">
+                <a:spAutoFit/>
+              </a:bodyPr>
+              <a:lstStyle/>
+              <a:p>
+                <a:r>
+                  <a:rPr lang="fr-FR" sz="1000" dirty="0"/>
+                  <a:t>Liste des tests :</a:t>
+                </a:r>
+              </a:p>
+              <a:p>
+                <a:endParaRPr lang="fr-FR" sz="1000" dirty="0"/>
+              </a:p>
+            </p:txBody>
+          </p:sp>
+          <p:sp>
+            <p:nvSpPr>
+              <p:cNvPr id="16" name="ZoneTexte 15">
+                <a:extLst>
+                  <a:ext uri="{FF2B5EF4-FFF2-40B4-BE49-F238E27FC236}">
+                    <a16:creationId xmlns:a16="http://schemas.microsoft.com/office/drawing/2014/main" id="{976E0E53-FD9F-4E05-9772-6403C09432D2}"/>
+                  </a:ext>
+                </a:extLst>
+              </p:cNvPr>
+              <p:cNvSpPr txBox="1"/>
+              <p:nvPr/>
+            </p:nvSpPr>
+            <p:spPr>
+              <a:xfrm>
+                <a:off x="881832" y="2938472"/>
+                <a:ext cx="3240360" cy="400110"/>
+              </a:xfrm>
+              <a:prstGeom prst="rect">
+                <a:avLst/>
+              </a:prstGeom>
+              <a:noFill/>
+            </p:spPr>
+            <p:txBody>
+              <a:bodyPr wrap="square" rtlCol="0">
+                <a:spAutoFit/>
+              </a:bodyPr>
+              <a:lstStyle/>
+              <a:p>
+                <a:r>
+                  <a:rPr lang="fr-FR" sz="1000" dirty="0"/>
+                  <a:t>Liste des tests :</a:t>
+                </a:r>
+              </a:p>
+              <a:p>
+                <a:endParaRPr lang="fr-FR" sz="1000" dirty="0"/>
+              </a:p>
+            </p:txBody>
+          </p:sp>
+        </p:grpSp>
+        <p:cxnSp>
+          <p:nvCxnSpPr>
+            <p:cNvPr id="13" name="Connecteur droit 12">
+              <a:extLst>
+                <a:ext uri="{FF2B5EF4-FFF2-40B4-BE49-F238E27FC236}">
+                  <a16:creationId xmlns:a16="http://schemas.microsoft.com/office/drawing/2014/main" id="{21394F91-921A-4BBF-B4EC-B63598DE040A}"/>
+                </a:ext>
+              </a:extLst>
+            </p:cNvPr>
+            <p:cNvCxnSpPr/>
+            <p:nvPr/>
+          </p:nvCxnSpPr>
+          <p:spPr>
+            <a:xfrm>
+              <a:off x="1115616" y="1988840"/>
+              <a:ext cx="3312368" cy="0"/>
+            </a:xfrm>
+            <a:prstGeom prst="line">
+              <a:avLst/>
+            </a:prstGeom>
+          </p:spPr>
+          <p:style>
+            <a:lnRef idx="1">
+              <a:schemeClr val="dk1"/>
+            </a:lnRef>
+            <a:fillRef idx="0">
+              <a:schemeClr val="dk1"/>
+            </a:fillRef>
+            <a:effectRef idx="0">
+              <a:schemeClr val="dk1"/>
+            </a:effectRef>
+            <a:fontRef idx="minor">
+              <a:schemeClr val="tx1"/>
+            </a:fontRef>
+          </p:style>
+        </p:cxnSp>
+        <p:sp>
+          <p:nvSpPr>
+            <p:cNvPr id="14" name="Rectangle : coins arrondis 13">
+              <a:extLst>
+                <a:ext uri="{FF2B5EF4-FFF2-40B4-BE49-F238E27FC236}">
+                  <a16:creationId xmlns:a16="http://schemas.microsoft.com/office/drawing/2014/main" id="{29329E08-603A-4562-9B04-3404D634631F}"/>
+                </a:ext>
+              </a:extLst>
+            </p:cNvPr>
+            <p:cNvSpPr/>
+            <p:nvPr/>
+          </p:nvSpPr>
+          <p:spPr>
+            <a:xfrm>
+              <a:off x="1619672" y="1484784"/>
+              <a:ext cx="2232248" cy="441340"/>
+            </a:xfrm>
+            <a:prstGeom prst="roundRect">
+              <a:avLst/>
+            </a:prstGeom>
+            <a:solidFill>
+              <a:schemeClr val="bg1">
+                <a:lumMod val="85000"/>
+              </a:schemeClr>
+            </a:solidFill>
+            <a:ln>
+              <a:noFill/>
+            </a:ln>
+            <a:effectLst/>
+          </p:spPr>
+          <p:style>
+            <a:lnRef idx="1">
+              <a:schemeClr val="dk1"/>
+            </a:lnRef>
+            <a:fillRef idx="2">
+              <a:schemeClr val="dk1"/>
+            </a:fillRef>
+            <a:effectRef idx="1">
+              <a:schemeClr val="dk1"/>
+            </a:effectRef>
+            <a:fontRef idx="minor">
+              <a:schemeClr val="dk1"/>
+            </a:fontRef>
+          </p:style>
+          <p:txBody>
+            <a:bodyPr rtlCol="0" anchor="ctr"/>
+            <a:lstStyle/>
+            <a:p>
+              <a:pPr algn="ctr"/>
+              <a:r>
+                <a:rPr lang="fr-FR" dirty="0"/>
+                <a:t>TEST</a:t>
+              </a:r>
+            </a:p>
+          </p:txBody>
+        </p:sp>
+      </p:grpSp>
+      <p:graphicFrame>
+        <p:nvGraphicFramePr>
+          <p:cNvPr id="11" name="Tableau 11">
+            <a:extLst>
+              <a:ext uri="{FF2B5EF4-FFF2-40B4-BE49-F238E27FC236}">
+                <a16:creationId xmlns:a16="http://schemas.microsoft.com/office/drawing/2014/main" id="{A1023824-A02A-4476-99FB-AF43C1B65385}"/>
+              </a:ext>
+            </a:extLst>
+          </p:cNvPr>
+          <p:cNvGraphicFramePr>
+            <a:graphicFrameLocks noGrp="1"/>
+          </p:cNvGraphicFramePr>
+          <p:nvPr>
+            <p:extLst>
+              <p:ext uri="{D42A27DB-BD31-4B8C-83A1-F6EECF244321}">
+                <p14:modId xmlns:p14="http://schemas.microsoft.com/office/powerpoint/2010/main" val="1306249698"/>
+              </p:ext>
+            </p:extLst>
+          </p:nvPr>
+        </p:nvGraphicFramePr>
+        <p:xfrm>
+          <a:off x="971600" y="2396044"/>
+          <a:ext cx="3528390" cy="335280"/>
+        </p:xfrm>
+        <a:graphic>
+          <a:graphicData uri="http://schemas.openxmlformats.org/drawingml/2006/table">
+            <a:tbl>
+              <a:tblPr firstRow="1" bandRow="1">
+                <a:tableStyleId>{5940675A-B579-460E-94D1-54222C63F5DA}</a:tableStyleId>
+              </a:tblPr>
+              <a:tblGrid>
+                <a:gridCol w="588065">
+                  <a:extLst>
+                    <a:ext uri="{9D8B030D-6E8A-4147-A177-3AD203B41FA5}">
+                      <a16:colId xmlns:a16="http://schemas.microsoft.com/office/drawing/2014/main" val="1107729764"/>
+                    </a:ext>
+                  </a:extLst>
+                </a:gridCol>
+                <a:gridCol w="588065">
+                  <a:extLst>
+                    <a:ext uri="{9D8B030D-6E8A-4147-A177-3AD203B41FA5}">
+                      <a16:colId xmlns:a16="http://schemas.microsoft.com/office/drawing/2014/main" val="876737217"/>
+                    </a:ext>
+                  </a:extLst>
+                </a:gridCol>
+                <a:gridCol w="588065">
+                  <a:extLst>
+                    <a:ext uri="{9D8B030D-6E8A-4147-A177-3AD203B41FA5}">
+                      <a16:colId xmlns:a16="http://schemas.microsoft.com/office/drawing/2014/main" val="1601857403"/>
+                    </a:ext>
+                  </a:extLst>
+                </a:gridCol>
+                <a:gridCol w="588065">
+                  <a:extLst>
+                    <a:ext uri="{9D8B030D-6E8A-4147-A177-3AD203B41FA5}">
+                      <a16:colId xmlns:a16="http://schemas.microsoft.com/office/drawing/2014/main" val="1016315755"/>
+                    </a:ext>
+                  </a:extLst>
+                </a:gridCol>
+                <a:gridCol w="588065">
+                  <a:extLst>
+                    <a:ext uri="{9D8B030D-6E8A-4147-A177-3AD203B41FA5}">
+                      <a16:colId xmlns:a16="http://schemas.microsoft.com/office/drawing/2014/main" val="2123422907"/>
+                    </a:ext>
+                  </a:extLst>
+                </a:gridCol>
+                <a:gridCol w="588065">
+                  <a:extLst>
+                    <a:ext uri="{9D8B030D-6E8A-4147-A177-3AD203B41FA5}">
+                      <a16:colId xmlns:a16="http://schemas.microsoft.com/office/drawing/2014/main" val="3886583170"/>
+                    </a:ext>
+                  </a:extLst>
+                </a:gridCol>
+              </a:tblGrid>
+              <a:tr h="193514">
+                <a:tc>
+                  <a:txBody>
+                    <a:bodyPr/>
+                    <a:lstStyle/>
+                    <a:p>
+                      <a:r>
+                        <a:rPr lang="fr-FR" sz="800" dirty="0"/>
+                        <a:t>Id</a:t>
+                      </a:r>
+                    </a:p>
+                  </a:txBody>
+                  <a:tcPr/>
+                </a:tc>
+                <a:tc>
+                  <a:txBody>
+                    <a:bodyPr/>
+                    <a:lstStyle/>
+                    <a:p>
+                      <a:r>
+                        <a:rPr lang="fr-FR" sz="800" dirty="0"/>
+                        <a:t>Label</a:t>
+                      </a:r>
+                    </a:p>
+                  </a:txBody>
+                  <a:tcPr/>
+                </a:tc>
+                <a:tc>
+                  <a:txBody>
+                    <a:bodyPr/>
+                    <a:lstStyle/>
+                    <a:p>
+                      <a:r>
+                        <a:rPr lang="fr-FR" sz="800" dirty="0"/>
+                        <a:t>Re</a:t>
+                      </a:r>
+                    </a:p>
+                  </a:txBody>
+                  <a:tcPr/>
+                </a:tc>
+                <a:tc>
+                  <a:txBody>
+                    <a:bodyPr/>
+                    <a:lstStyle/>
+                    <a:p>
+                      <a:r>
+                        <a:rPr lang="fr-FR" sz="800" dirty="0"/>
+                        <a:t>Onetoonebis.id</a:t>
+                      </a:r>
+                    </a:p>
+                  </a:txBody>
+                  <a:tcPr/>
+                </a:tc>
+                <a:tc>
+                  <a:txBody>
+                    <a:bodyPr/>
+                    <a:lstStyle/>
+                    <a:p>
+                      <a:r>
+                        <a:rPr lang="fr-FR" sz="800" dirty="0"/>
+                        <a:t>[onetomanybis.id]</a:t>
+                      </a:r>
+                    </a:p>
+                  </a:txBody>
+                  <a:tcPr/>
+                </a:tc>
+                <a:tc>
+                  <a:txBody>
+                    <a:bodyPr/>
+                    <a:lstStyle/>
+                    <a:p>
+                      <a:r>
+                        <a:rPr lang="fr-FR" sz="800" dirty="0"/>
+                        <a:t>Manytoonebis.id</a:t>
+                      </a:r>
+                    </a:p>
+                  </a:txBody>
+                  <a:tcPr/>
+                </a:tc>
+                <a:extLst>
+                  <a:ext uri="{0D108BD9-81ED-4DB2-BD59-A6C34878D82A}">
+                    <a16:rowId xmlns:a16="http://schemas.microsoft.com/office/drawing/2014/main" val="1351064631"/>
+                  </a:ext>
+                </a:extLst>
+              </a:tr>
+            </a:tbl>
+          </a:graphicData>
+        </a:graphic>
+      </p:graphicFrame>
+      <p:graphicFrame>
+        <p:nvGraphicFramePr>
+          <p:cNvPr id="17" name="Tableau 11">
+            <a:extLst>
+              <a:ext uri="{FF2B5EF4-FFF2-40B4-BE49-F238E27FC236}">
+                <a16:creationId xmlns:a16="http://schemas.microsoft.com/office/drawing/2014/main" id="{A9D9493C-F037-4480-8E4A-70225C2F5D45}"/>
+              </a:ext>
+            </a:extLst>
+          </p:cNvPr>
+          <p:cNvGraphicFramePr>
+            <a:graphicFrameLocks noGrp="1"/>
+          </p:cNvGraphicFramePr>
+          <p:nvPr>
+            <p:extLst>
+              <p:ext uri="{D42A27DB-BD31-4B8C-83A1-F6EECF244321}">
+                <p14:modId xmlns:p14="http://schemas.microsoft.com/office/powerpoint/2010/main" val="3634573544"/>
+              </p:ext>
+            </p:extLst>
+          </p:nvPr>
+        </p:nvGraphicFramePr>
+        <p:xfrm>
+          <a:off x="1043608" y="3197568"/>
+          <a:ext cx="2256252" cy="335280"/>
+        </p:xfrm>
+        <a:graphic>
+          <a:graphicData uri="http://schemas.openxmlformats.org/drawingml/2006/table">
+            <a:tbl>
+              <a:tblPr firstRow="1" bandRow="1">
+                <a:tableStyleId>{5940675A-B579-460E-94D1-54222C63F5DA}</a:tableStyleId>
+              </a:tblPr>
+              <a:tblGrid>
+                <a:gridCol w="564063">
+                  <a:extLst>
+                    <a:ext uri="{9D8B030D-6E8A-4147-A177-3AD203B41FA5}">
+                      <a16:colId xmlns:a16="http://schemas.microsoft.com/office/drawing/2014/main" val="1107729764"/>
+                    </a:ext>
+                  </a:extLst>
+                </a:gridCol>
+                <a:gridCol w="564063">
+                  <a:extLst>
+                    <a:ext uri="{9D8B030D-6E8A-4147-A177-3AD203B41FA5}">
+                      <a16:colId xmlns:a16="http://schemas.microsoft.com/office/drawing/2014/main" val="1016315755"/>
+                    </a:ext>
+                  </a:extLst>
+                </a:gridCol>
+                <a:gridCol w="564063">
+                  <a:extLst>
+                    <a:ext uri="{9D8B030D-6E8A-4147-A177-3AD203B41FA5}">
+                      <a16:colId xmlns:a16="http://schemas.microsoft.com/office/drawing/2014/main" val="2123422907"/>
+                    </a:ext>
+                  </a:extLst>
+                </a:gridCol>
+                <a:gridCol w="564063">
+                  <a:extLst>
+                    <a:ext uri="{9D8B030D-6E8A-4147-A177-3AD203B41FA5}">
+                      <a16:colId xmlns:a16="http://schemas.microsoft.com/office/drawing/2014/main" val="3886583170"/>
+                    </a:ext>
+                  </a:extLst>
+                </a:gridCol>
+              </a:tblGrid>
+              <a:tr h="193514">
+                <a:tc>
+                  <a:txBody>
+                    <a:bodyPr/>
+                    <a:lstStyle/>
+                    <a:p>
+                      <a:r>
+                        <a:rPr lang="fr-FR" sz="800" dirty="0"/>
+                        <a:t>Id</a:t>
+                      </a:r>
+                    </a:p>
+                  </a:txBody>
+                  <a:tcPr/>
+                </a:tc>
+                <a:tc>
+                  <a:txBody>
+                    <a:bodyPr/>
+                    <a:lstStyle/>
+                    <a:p>
+                      <a:r>
+                        <a:rPr lang="fr-FR" sz="800" dirty="0"/>
+                        <a:t>Onetoone.id</a:t>
+                      </a:r>
+                    </a:p>
+                  </a:txBody>
+                  <a:tcPr/>
+                </a:tc>
+                <a:tc>
+                  <a:txBody>
+                    <a:bodyPr/>
+                    <a:lstStyle/>
+                    <a:p>
+                      <a:r>
+                        <a:rPr lang="fr-FR" sz="800" dirty="0"/>
+                        <a:t>onetomany.id</a:t>
+                      </a:r>
+                    </a:p>
+                  </a:txBody>
+                  <a:tcPr/>
+                </a:tc>
+                <a:tc>
+                  <a:txBody>
+                    <a:bodyPr/>
+                    <a:lstStyle/>
+                    <a:p>
+                      <a:r>
+                        <a:rPr lang="fr-FR" sz="800" dirty="0"/>
+                        <a:t>[Manytoone.id]</a:t>
+                      </a:r>
+                    </a:p>
+                  </a:txBody>
+                  <a:tcPr/>
+                </a:tc>
+                <a:extLst>
+                  <a:ext uri="{0D108BD9-81ED-4DB2-BD59-A6C34878D82A}">
+                    <a16:rowId xmlns:a16="http://schemas.microsoft.com/office/drawing/2014/main" val="1351064631"/>
+                  </a:ext>
+                </a:extLst>
+              </a:tr>
+            </a:tbl>
+          </a:graphicData>
+        </a:graphic>
+      </p:graphicFrame>
+    </p:spTree>
+    <p:extLst>
+      <p:ext uri="{BB962C8B-B14F-4D97-AF65-F5344CB8AC3E}">
+        <p14:creationId xmlns:p14="http://schemas.microsoft.com/office/powerpoint/2010/main" val="3323526696"/>
+      </p:ext>
+    </p:extLst>
+  </p:cSld>
+  <p:clrMapOvr>
+    <a:masterClrMapping/>
+  </p:clrMapOvr>
+</p:sld>
+</file>
+
 <file path=ppt/theme/theme1.xml><?xml version="1.0" encoding="utf-8"?>
 <a:theme xmlns:a="http://schemas.openxmlformats.org/drawingml/2006/main" name="Thème Office">
   <a:themeElements>

</xml_diff>

<commit_message>
[T008][T009][T010] ajout des classes pojo, repo, services, controller pour sim et famille
</commit_message>
<xml_diff>
--- a/src/main/resources/mq.pptx
+++ b/src/main/resources/mq.pptx
@@ -9,6 +9,7 @@
     <p:sldId id="257" r:id="rId3"/>
     <p:sldId id="258" r:id="rId4"/>
     <p:sldId id="259" r:id="rId5"/>
+    <p:sldId id="260" r:id="rId6"/>
   </p:sldIdLst>
   <p:sldSz cx="9144000" cy="6858000" type="screen4x3"/>
   <p:notesSz cx="6858000" cy="9144000"/>
@@ -305,7 +306,7 @@
           <a:p>
             <a:fld id="{1DDB72BE-B427-4A6F-AFFD-AFAC62060F46}" type="datetimeFigureOut">
               <a:rPr lang="fr-FR" smtClean="0"/>
-              <a:t>29/03/2020</a:t>
+              <a:t>11/04/2020</a:t>
             </a:fld>
             <a:endParaRPr lang="fr-FR"/>
           </a:p>
@@ -473,7 +474,7 @@
           <a:p>
             <a:fld id="{1DDB72BE-B427-4A6F-AFFD-AFAC62060F46}" type="datetimeFigureOut">
               <a:rPr lang="fr-FR" smtClean="0"/>
-              <a:t>29/03/2020</a:t>
+              <a:t>11/04/2020</a:t>
             </a:fld>
             <a:endParaRPr lang="fr-FR"/>
           </a:p>
@@ -651,7 +652,7 @@
           <a:p>
             <a:fld id="{1DDB72BE-B427-4A6F-AFFD-AFAC62060F46}" type="datetimeFigureOut">
               <a:rPr lang="fr-FR" smtClean="0"/>
-              <a:t>29/03/2020</a:t>
+              <a:t>11/04/2020</a:t>
             </a:fld>
             <a:endParaRPr lang="fr-FR"/>
           </a:p>
@@ -819,7 +820,7 @@
           <a:p>
             <a:fld id="{1DDB72BE-B427-4A6F-AFFD-AFAC62060F46}" type="datetimeFigureOut">
               <a:rPr lang="fr-FR" smtClean="0"/>
-              <a:t>29/03/2020</a:t>
+              <a:t>11/04/2020</a:t>
             </a:fld>
             <a:endParaRPr lang="fr-FR"/>
           </a:p>
@@ -1064,7 +1065,7 @@
           <a:p>
             <a:fld id="{1DDB72BE-B427-4A6F-AFFD-AFAC62060F46}" type="datetimeFigureOut">
               <a:rPr lang="fr-FR" smtClean="0"/>
-              <a:t>29/03/2020</a:t>
+              <a:t>11/04/2020</a:t>
             </a:fld>
             <a:endParaRPr lang="fr-FR"/>
           </a:p>
@@ -1349,7 +1350,7 @@
           <a:p>
             <a:fld id="{1DDB72BE-B427-4A6F-AFFD-AFAC62060F46}" type="datetimeFigureOut">
               <a:rPr lang="fr-FR" smtClean="0"/>
-              <a:t>29/03/2020</a:t>
+              <a:t>11/04/2020</a:t>
             </a:fld>
             <a:endParaRPr lang="fr-FR"/>
           </a:p>
@@ -1768,7 +1769,7 @@
           <a:p>
             <a:fld id="{1DDB72BE-B427-4A6F-AFFD-AFAC62060F46}" type="datetimeFigureOut">
               <a:rPr lang="fr-FR" smtClean="0"/>
-              <a:t>29/03/2020</a:t>
+              <a:t>11/04/2020</a:t>
             </a:fld>
             <a:endParaRPr lang="fr-FR"/>
           </a:p>
@@ -1885,7 +1886,7 @@
           <a:p>
             <a:fld id="{1DDB72BE-B427-4A6F-AFFD-AFAC62060F46}" type="datetimeFigureOut">
               <a:rPr lang="fr-FR" smtClean="0"/>
-              <a:t>29/03/2020</a:t>
+              <a:t>11/04/2020</a:t>
             </a:fld>
             <a:endParaRPr lang="fr-FR"/>
           </a:p>
@@ -1980,7 +1981,7 @@
           <a:p>
             <a:fld id="{1DDB72BE-B427-4A6F-AFFD-AFAC62060F46}" type="datetimeFigureOut">
               <a:rPr lang="fr-FR" smtClean="0"/>
-              <a:t>29/03/2020</a:t>
+              <a:t>11/04/2020</a:t>
             </a:fld>
             <a:endParaRPr lang="fr-FR"/>
           </a:p>
@@ -2255,7 +2256,7 @@
           <a:p>
             <a:fld id="{1DDB72BE-B427-4A6F-AFFD-AFAC62060F46}" type="datetimeFigureOut">
               <a:rPr lang="fr-FR" smtClean="0"/>
-              <a:t>29/03/2020</a:t>
+              <a:t>11/04/2020</a:t>
             </a:fld>
             <a:endParaRPr lang="fr-FR"/>
           </a:p>
@@ -2507,7 +2508,7 @@
           <a:p>
             <a:fld id="{1DDB72BE-B427-4A6F-AFFD-AFAC62060F46}" type="datetimeFigureOut">
               <a:rPr lang="fr-FR" smtClean="0"/>
-              <a:t>29/03/2020</a:t>
+              <a:t>11/04/2020</a:t>
             </a:fld>
             <a:endParaRPr lang="fr-FR"/>
           </a:p>
@@ -2718,7 +2719,7 @@
           <a:p>
             <a:fld id="{1DDB72BE-B427-4A6F-AFFD-AFAC62060F46}" type="datetimeFigureOut">
               <a:rPr lang="fr-FR" smtClean="0"/>
-              <a:t>29/03/2020</a:t>
+              <a:t>11/04/2020</a:t>
             </a:fld>
             <a:endParaRPr lang="fr-FR"/>
           </a:p>
@@ -3548,6 +3549,139 @@
             <a:r>
               <a:rPr lang="fr-FR" dirty="0"/>
               <a:t>Barre de navigation</a:t>
+            </a:r>
+          </a:p>
+        </p:txBody>
+      </p:sp>
+      <p:sp>
+        <p:nvSpPr>
+          <p:cNvPr id="10" name="ZoneTexte 9">
+            <a:extLst>
+              <a:ext uri="{FF2B5EF4-FFF2-40B4-BE49-F238E27FC236}">
+                <a16:creationId xmlns:a16="http://schemas.microsoft.com/office/drawing/2014/main" id="{3098B110-6723-41A7-98B0-2FFDEE18242B}"/>
+              </a:ext>
+            </a:extLst>
+          </p:cNvPr>
+          <p:cNvSpPr txBox="1"/>
+          <p:nvPr/>
+        </p:nvSpPr>
+        <p:spPr>
+          <a:xfrm>
+            <a:off x="1344454" y="824225"/>
+            <a:ext cx="936104" cy="276999"/>
+          </a:xfrm>
+          <a:prstGeom prst="rect">
+            <a:avLst/>
+          </a:prstGeom>
+          <a:noFill/>
+        </p:spPr>
+        <p:txBody>
+          <a:bodyPr wrap="square" rtlCol="0">
+            <a:spAutoFit/>
+          </a:bodyPr>
+          <a:lstStyle/>
+          <a:p>
+            <a:pPr algn="ctr"/>
+            <a:r>
+              <a:rPr lang="fr-FR" sz="1200" dirty="0"/>
+              <a:t>Famille</a:t>
+            </a:r>
+          </a:p>
+        </p:txBody>
+      </p:sp>
+      <p:sp>
+        <p:nvSpPr>
+          <p:cNvPr id="11" name="Rectangle 10">
+            <a:extLst>
+              <a:ext uri="{FF2B5EF4-FFF2-40B4-BE49-F238E27FC236}">
+                <a16:creationId xmlns:a16="http://schemas.microsoft.com/office/drawing/2014/main" id="{19C26401-1EAA-4F62-9AB9-0FE12DACC8B5}"/>
+              </a:ext>
+            </a:extLst>
+          </p:cNvPr>
+          <p:cNvSpPr/>
+          <p:nvPr/>
+        </p:nvSpPr>
+        <p:spPr>
+          <a:xfrm>
+            <a:off x="1549623" y="1101224"/>
+            <a:ext cx="646113" cy="887616"/>
+          </a:xfrm>
+          <a:prstGeom prst="rect">
+            <a:avLst/>
+          </a:prstGeom>
+          <a:solidFill>
+            <a:schemeClr val="bg1"/>
+          </a:solidFill>
+          <a:ln>
+            <a:solidFill>
+              <a:schemeClr val="tx1"/>
+            </a:solidFill>
+          </a:ln>
+        </p:spPr>
+        <p:style>
+          <a:lnRef idx="2">
+            <a:schemeClr val="accent1">
+              <a:shade val="50000"/>
+            </a:schemeClr>
+          </a:lnRef>
+          <a:fillRef idx="1">
+            <a:schemeClr val="accent1"/>
+          </a:fillRef>
+          <a:effectRef idx="0">
+            <a:schemeClr val="accent1"/>
+          </a:effectRef>
+          <a:fontRef idx="minor">
+            <a:schemeClr val="lt1"/>
+          </a:fontRef>
+        </p:style>
+        <p:txBody>
+          <a:bodyPr rtlCol="0" anchor="ctr"/>
+          <a:lstStyle/>
+          <a:p>
+            <a:pPr algn="ctr"/>
+            <a:endParaRPr lang="fr-FR"/>
+          </a:p>
+        </p:txBody>
+      </p:sp>
+      <p:sp>
+        <p:nvSpPr>
+          <p:cNvPr id="12" name="ZoneTexte 11">
+            <a:extLst>
+              <a:ext uri="{FF2B5EF4-FFF2-40B4-BE49-F238E27FC236}">
+                <a16:creationId xmlns:a16="http://schemas.microsoft.com/office/drawing/2014/main" id="{34A6C5D9-1AA9-438B-A32B-E9167C1D3EE4}"/>
+              </a:ext>
+            </a:extLst>
+          </p:cNvPr>
+          <p:cNvSpPr txBox="1"/>
+          <p:nvPr/>
+        </p:nvSpPr>
+        <p:spPr>
+          <a:xfrm>
+            <a:off x="1404627" y="1120001"/>
+            <a:ext cx="936104" cy="400110"/>
+          </a:xfrm>
+          <a:prstGeom prst="rect">
+            <a:avLst/>
+          </a:prstGeom>
+          <a:noFill/>
+        </p:spPr>
+        <p:txBody>
+          <a:bodyPr wrap="square" rtlCol="0">
+            <a:spAutoFit/>
+          </a:bodyPr>
+          <a:lstStyle/>
+          <a:p>
+            <a:pPr algn="ctr"/>
+            <a:r>
+              <a:rPr lang="fr-FR" sz="1000" dirty="0"/>
+              <a:t>Liste </a:t>
+            </a:r>
+          </a:p>
+          <a:p>
+            <a:pPr algn="ctr"/>
+            <a:r>
+              <a:rPr lang="fr-FR" sz="1000" dirty="0"/>
+              <a:t>familles</a:t>
             </a:r>
           </a:p>
         </p:txBody>
@@ -4258,6 +4392,42 @@
           </p:style>
         </p:cxnSp>
       </p:grpSp>
+      <p:sp>
+        <p:nvSpPr>
+          <p:cNvPr id="16" name="ZoneTexte 15">
+            <a:extLst>
+              <a:ext uri="{FF2B5EF4-FFF2-40B4-BE49-F238E27FC236}">
+                <a16:creationId xmlns:a16="http://schemas.microsoft.com/office/drawing/2014/main" id="{4F6B3E4C-B397-4CA8-8ACE-6F4427B5DA67}"/>
+              </a:ext>
+            </a:extLst>
+          </p:cNvPr>
+          <p:cNvSpPr txBox="1"/>
+          <p:nvPr/>
+        </p:nvSpPr>
+        <p:spPr>
+          <a:xfrm>
+            <a:off x="1344454" y="824225"/>
+            <a:ext cx="936104" cy="276999"/>
+          </a:xfrm>
+          <a:prstGeom prst="rect">
+            <a:avLst/>
+          </a:prstGeom>
+          <a:noFill/>
+        </p:spPr>
+        <p:txBody>
+          <a:bodyPr wrap="square" rtlCol="0">
+            <a:spAutoFit/>
+          </a:bodyPr>
+          <a:lstStyle/>
+          <a:p>
+            <a:pPr algn="ctr"/>
+            <a:r>
+              <a:rPr lang="fr-FR" sz="1200" dirty="0"/>
+              <a:t>Famille</a:t>
+            </a:r>
+          </a:p>
+        </p:txBody>
+      </p:sp>
     </p:spTree>
     <p:extLst>
       <p:ext uri="{BB962C8B-B14F-4D97-AF65-F5344CB8AC3E}">
@@ -4974,6 +5144,42 @@
           </p:txBody>
         </p:sp>
       </p:grpSp>
+      <p:sp>
+        <p:nvSpPr>
+          <p:cNvPr id="16" name="ZoneTexte 15">
+            <a:extLst>
+              <a:ext uri="{FF2B5EF4-FFF2-40B4-BE49-F238E27FC236}">
+                <a16:creationId xmlns:a16="http://schemas.microsoft.com/office/drawing/2014/main" id="{CFB2A607-CBC0-4AE6-8328-9FBE3031B3EE}"/>
+              </a:ext>
+            </a:extLst>
+          </p:cNvPr>
+          <p:cNvSpPr txBox="1"/>
+          <p:nvPr/>
+        </p:nvSpPr>
+        <p:spPr>
+          <a:xfrm>
+            <a:off x="1344454" y="824225"/>
+            <a:ext cx="936104" cy="276999"/>
+          </a:xfrm>
+          <a:prstGeom prst="rect">
+            <a:avLst/>
+          </a:prstGeom>
+          <a:noFill/>
+        </p:spPr>
+        <p:txBody>
+          <a:bodyPr wrap="square" rtlCol="0">
+            <a:spAutoFit/>
+          </a:bodyPr>
+          <a:lstStyle/>
+          <a:p>
+            <a:pPr algn="ctr"/>
+            <a:r>
+              <a:rPr lang="fr-FR" sz="1200" dirty="0"/>
+              <a:t>Famille</a:t>
+            </a:r>
+          </a:p>
+        </p:txBody>
+      </p:sp>
     </p:spTree>
     <p:extLst>
       <p:ext uri="{BB962C8B-B14F-4D97-AF65-F5344CB8AC3E}">
@@ -5320,7 +5526,7 @@
           <a:p>
             <a:r>
               <a:rPr lang="fr-FR" dirty="0"/>
-              <a:t>Ecran erreur</a:t>
+              <a:t>Ecran test</a:t>
             </a:r>
           </a:p>
         </p:txBody>
@@ -6016,10 +6222,885 @@
           </a:graphicData>
         </a:graphic>
       </p:graphicFrame>
+      <p:sp>
+        <p:nvSpPr>
+          <p:cNvPr id="18" name="ZoneTexte 17">
+            <a:extLst>
+              <a:ext uri="{FF2B5EF4-FFF2-40B4-BE49-F238E27FC236}">
+                <a16:creationId xmlns:a16="http://schemas.microsoft.com/office/drawing/2014/main" id="{DBEF6CCB-532D-4911-9CB1-DF473B72FDB9}"/>
+              </a:ext>
+            </a:extLst>
+          </p:cNvPr>
+          <p:cNvSpPr txBox="1"/>
+          <p:nvPr/>
+        </p:nvSpPr>
+        <p:spPr>
+          <a:xfrm>
+            <a:off x="1344454" y="824225"/>
+            <a:ext cx="936104" cy="276999"/>
+          </a:xfrm>
+          <a:prstGeom prst="rect">
+            <a:avLst/>
+          </a:prstGeom>
+          <a:noFill/>
+        </p:spPr>
+        <p:txBody>
+          <a:bodyPr wrap="square" rtlCol="0">
+            <a:spAutoFit/>
+          </a:bodyPr>
+          <a:lstStyle/>
+          <a:p>
+            <a:pPr algn="ctr"/>
+            <a:r>
+              <a:rPr lang="fr-FR" sz="1200" dirty="0"/>
+              <a:t>Famille</a:t>
+            </a:r>
+          </a:p>
+        </p:txBody>
+      </p:sp>
     </p:spTree>
     <p:extLst>
       <p:ext uri="{BB962C8B-B14F-4D97-AF65-F5344CB8AC3E}">
         <p14:creationId xmlns:p14="http://schemas.microsoft.com/office/powerpoint/2010/main" val="3323526696"/>
+      </p:ext>
+    </p:extLst>
+  </p:cSld>
+  <p:clrMapOvr>
+    <a:masterClrMapping/>
+  </p:clrMapOvr>
+</p:sld>
+</file>
+
+<file path=ppt/slides/slide5.xml><?xml version="1.0" encoding="utf-8"?>
+<p:sld xmlns:a="http://schemas.openxmlformats.org/drawingml/2006/main" xmlns:r="http://schemas.openxmlformats.org/officeDocument/2006/relationships" xmlns:p="http://schemas.openxmlformats.org/presentationml/2006/main">
+  <p:cSld>
+    <p:spTree>
+      <p:nvGrpSpPr>
+        <p:cNvPr id="1" name=""/>
+        <p:cNvGrpSpPr/>
+        <p:nvPr/>
+      </p:nvGrpSpPr>
+      <p:grpSpPr>
+        <a:xfrm>
+          <a:off x="0" y="0"/>
+          <a:ext cx="0" cy="0"/>
+          <a:chOff x="0" y="0"/>
+          <a:chExt cx="0" cy="0"/>
+        </a:xfrm>
+      </p:grpSpPr>
+      <p:graphicFrame>
+        <p:nvGraphicFramePr>
+          <p:cNvPr id="6" name="Tableau 5"/>
+          <p:cNvGraphicFramePr>
+            <a:graphicFrameLocks noGrp="1"/>
+          </p:cNvGraphicFramePr>
+          <p:nvPr>
+            <p:extLst>
+              <p:ext uri="{D42A27DB-BD31-4B8C-83A1-F6EECF244321}">
+                <p14:modId xmlns:p14="http://schemas.microsoft.com/office/powerpoint/2010/main" val="1734683742"/>
+              </p:ext>
+            </p:extLst>
+          </p:nvPr>
+        </p:nvGraphicFramePr>
+        <p:xfrm>
+          <a:off x="4932040" y="1397000"/>
+          <a:ext cx="3960440" cy="3053080"/>
+        </p:xfrm>
+        <a:graphic>
+          <a:graphicData uri="http://schemas.openxmlformats.org/drawingml/2006/table">
+            <a:tbl>
+              <a:tblPr firstRow="1" bandRow="1">
+                <a:tableStyleId>{5940675A-B579-460E-94D1-54222C63F5DA}</a:tableStyleId>
+              </a:tblPr>
+              <a:tblGrid>
+                <a:gridCol w="720080">
+                  <a:extLst>
+                    <a:ext uri="{9D8B030D-6E8A-4147-A177-3AD203B41FA5}">
+                      <a16:colId xmlns:a16="http://schemas.microsoft.com/office/drawing/2014/main" val="20000"/>
+                    </a:ext>
+                  </a:extLst>
+                </a:gridCol>
+                <a:gridCol w="3240360">
+                  <a:extLst>
+                    <a:ext uri="{9D8B030D-6E8A-4147-A177-3AD203B41FA5}">
+                      <a16:colId xmlns:a16="http://schemas.microsoft.com/office/drawing/2014/main" val="20001"/>
+                    </a:ext>
+                  </a:extLst>
+                </a:gridCol>
+              </a:tblGrid>
+              <a:tr h="370840">
+                <a:tc>
+                  <a:txBody>
+                    <a:bodyPr/>
+                    <a:lstStyle/>
+                    <a:p>
+                      <a:r>
+                        <a:rPr lang="fr-FR" sz="1200" dirty="0"/>
+                        <a:t>V1.0</a:t>
+                      </a:r>
+                    </a:p>
+                  </a:txBody>
+                  <a:tcPr/>
+                </a:tc>
+                <a:tc>
+                  <a:txBody>
+                    <a:bodyPr/>
+                    <a:lstStyle/>
+                    <a:p>
+                      <a:pPr marL="0" marR="0" indent="0" algn="l" defTabSz="914400" rtl="0" eaLnBrk="1" fontAlgn="auto" latinLnBrk="0" hangingPunct="1">
+                        <a:lnSpc>
+                          <a:spcPct val="100000"/>
+                        </a:lnSpc>
+                        <a:spcBef>
+                          <a:spcPts val="0"/>
+                        </a:spcBef>
+                        <a:spcAft>
+                          <a:spcPts val="0"/>
+                        </a:spcAft>
+                        <a:buClrTx/>
+                        <a:buSzTx/>
+                        <a:buFontTx/>
+                        <a:buNone/>
+                        <a:tabLst/>
+                        <a:defRPr/>
+                      </a:pPr>
+                      <a:r>
+                        <a:rPr lang="fr-FR" sz="1200" dirty="0"/>
+                        <a:t>T010 – Création de l’écran liste des familles</a:t>
+                      </a:r>
+                    </a:p>
+                    <a:p>
+                      <a:endParaRPr lang="fr-FR" sz="1200" dirty="0"/>
+                    </a:p>
+                  </a:txBody>
+                  <a:tcPr/>
+                </a:tc>
+                <a:extLst>
+                  <a:ext uri="{0D108BD9-81ED-4DB2-BD59-A6C34878D82A}">
+                    <a16:rowId xmlns:a16="http://schemas.microsoft.com/office/drawing/2014/main" val="10000"/>
+                  </a:ext>
+                </a:extLst>
+              </a:tr>
+              <a:tr h="370840">
+                <a:tc>
+                  <a:txBody>
+                    <a:bodyPr/>
+                    <a:lstStyle/>
+                    <a:p>
+                      <a:endParaRPr lang="fr-FR" sz="1200"/>
+                    </a:p>
+                  </a:txBody>
+                  <a:tcPr/>
+                </a:tc>
+                <a:tc>
+                  <a:txBody>
+                    <a:bodyPr/>
+                    <a:lstStyle/>
+                    <a:p>
+                      <a:endParaRPr lang="fr-FR" sz="1200"/>
+                    </a:p>
+                  </a:txBody>
+                  <a:tcPr/>
+                </a:tc>
+                <a:extLst>
+                  <a:ext uri="{0D108BD9-81ED-4DB2-BD59-A6C34878D82A}">
+                    <a16:rowId xmlns:a16="http://schemas.microsoft.com/office/drawing/2014/main" val="10001"/>
+                  </a:ext>
+                </a:extLst>
+              </a:tr>
+              <a:tr h="370840">
+                <a:tc>
+                  <a:txBody>
+                    <a:bodyPr/>
+                    <a:lstStyle/>
+                    <a:p>
+                      <a:endParaRPr lang="fr-FR" sz="1200"/>
+                    </a:p>
+                  </a:txBody>
+                  <a:tcPr/>
+                </a:tc>
+                <a:tc>
+                  <a:txBody>
+                    <a:bodyPr/>
+                    <a:lstStyle/>
+                    <a:p>
+                      <a:endParaRPr lang="fr-FR" sz="1200"/>
+                    </a:p>
+                  </a:txBody>
+                  <a:tcPr/>
+                </a:tc>
+                <a:extLst>
+                  <a:ext uri="{0D108BD9-81ED-4DB2-BD59-A6C34878D82A}">
+                    <a16:rowId xmlns:a16="http://schemas.microsoft.com/office/drawing/2014/main" val="10002"/>
+                  </a:ext>
+                </a:extLst>
+              </a:tr>
+              <a:tr h="370840">
+                <a:tc>
+                  <a:txBody>
+                    <a:bodyPr/>
+                    <a:lstStyle/>
+                    <a:p>
+                      <a:endParaRPr lang="fr-FR" sz="1200"/>
+                    </a:p>
+                  </a:txBody>
+                  <a:tcPr/>
+                </a:tc>
+                <a:tc>
+                  <a:txBody>
+                    <a:bodyPr/>
+                    <a:lstStyle/>
+                    <a:p>
+                      <a:endParaRPr lang="fr-FR" sz="1200"/>
+                    </a:p>
+                  </a:txBody>
+                  <a:tcPr/>
+                </a:tc>
+                <a:extLst>
+                  <a:ext uri="{0D108BD9-81ED-4DB2-BD59-A6C34878D82A}">
+                    <a16:rowId xmlns:a16="http://schemas.microsoft.com/office/drawing/2014/main" val="10003"/>
+                  </a:ext>
+                </a:extLst>
+              </a:tr>
+              <a:tr h="370840">
+                <a:tc>
+                  <a:txBody>
+                    <a:bodyPr/>
+                    <a:lstStyle/>
+                    <a:p>
+                      <a:endParaRPr lang="fr-FR" sz="1200"/>
+                    </a:p>
+                  </a:txBody>
+                  <a:tcPr/>
+                </a:tc>
+                <a:tc>
+                  <a:txBody>
+                    <a:bodyPr/>
+                    <a:lstStyle/>
+                    <a:p>
+                      <a:endParaRPr lang="fr-FR" sz="1200"/>
+                    </a:p>
+                  </a:txBody>
+                  <a:tcPr/>
+                </a:tc>
+                <a:extLst>
+                  <a:ext uri="{0D108BD9-81ED-4DB2-BD59-A6C34878D82A}">
+                    <a16:rowId xmlns:a16="http://schemas.microsoft.com/office/drawing/2014/main" val="10004"/>
+                  </a:ext>
+                </a:extLst>
+              </a:tr>
+              <a:tr h="370840">
+                <a:tc>
+                  <a:txBody>
+                    <a:bodyPr/>
+                    <a:lstStyle/>
+                    <a:p>
+                      <a:endParaRPr lang="fr-FR" sz="1200"/>
+                    </a:p>
+                  </a:txBody>
+                  <a:tcPr/>
+                </a:tc>
+                <a:tc>
+                  <a:txBody>
+                    <a:bodyPr/>
+                    <a:lstStyle/>
+                    <a:p>
+                      <a:endParaRPr lang="fr-FR" sz="1200"/>
+                    </a:p>
+                  </a:txBody>
+                  <a:tcPr/>
+                </a:tc>
+                <a:extLst>
+                  <a:ext uri="{0D108BD9-81ED-4DB2-BD59-A6C34878D82A}">
+                    <a16:rowId xmlns:a16="http://schemas.microsoft.com/office/drawing/2014/main" val="10005"/>
+                  </a:ext>
+                </a:extLst>
+              </a:tr>
+              <a:tr h="370840">
+                <a:tc>
+                  <a:txBody>
+                    <a:bodyPr/>
+                    <a:lstStyle/>
+                    <a:p>
+                      <a:endParaRPr lang="fr-FR" sz="1200"/>
+                    </a:p>
+                  </a:txBody>
+                  <a:tcPr/>
+                </a:tc>
+                <a:tc>
+                  <a:txBody>
+                    <a:bodyPr/>
+                    <a:lstStyle/>
+                    <a:p>
+                      <a:endParaRPr lang="fr-FR" sz="1200"/>
+                    </a:p>
+                  </a:txBody>
+                  <a:tcPr/>
+                </a:tc>
+                <a:extLst>
+                  <a:ext uri="{0D108BD9-81ED-4DB2-BD59-A6C34878D82A}">
+                    <a16:rowId xmlns:a16="http://schemas.microsoft.com/office/drawing/2014/main" val="10006"/>
+                  </a:ext>
+                </a:extLst>
+              </a:tr>
+              <a:tr h="370840">
+                <a:tc>
+                  <a:txBody>
+                    <a:bodyPr/>
+                    <a:lstStyle/>
+                    <a:p>
+                      <a:endParaRPr lang="fr-FR" sz="1200"/>
+                    </a:p>
+                  </a:txBody>
+                  <a:tcPr/>
+                </a:tc>
+                <a:tc>
+                  <a:txBody>
+                    <a:bodyPr/>
+                    <a:lstStyle/>
+                    <a:p>
+                      <a:endParaRPr lang="fr-FR" sz="1200" dirty="0"/>
+                    </a:p>
+                  </a:txBody>
+                  <a:tcPr/>
+                </a:tc>
+                <a:extLst>
+                  <a:ext uri="{0D108BD9-81ED-4DB2-BD59-A6C34878D82A}">
+                    <a16:rowId xmlns:a16="http://schemas.microsoft.com/office/drawing/2014/main" val="10007"/>
+                  </a:ext>
+                </a:extLst>
+              </a:tr>
+            </a:tbl>
+          </a:graphicData>
+        </a:graphic>
+      </p:graphicFrame>
+      <p:sp>
+        <p:nvSpPr>
+          <p:cNvPr id="10" name="ZoneTexte 9">
+            <a:extLst>
+              <a:ext uri="{FF2B5EF4-FFF2-40B4-BE49-F238E27FC236}">
+                <a16:creationId xmlns:a16="http://schemas.microsoft.com/office/drawing/2014/main" id="{B08D4C3C-8EAE-49D8-A58A-BE3C4E499318}"/>
+              </a:ext>
+            </a:extLst>
+          </p:cNvPr>
+          <p:cNvSpPr txBox="1"/>
+          <p:nvPr/>
+        </p:nvSpPr>
+        <p:spPr>
+          <a:xfrm>
+            <a:off x="5220072" y="260648"/>
+            <a:ext cx="2808312" cy="369332"/>
+          </a:xfrm>
+          <a:prstGeom prst="rect">
+            <a:avLst/>
+          </a:prstGeom>
+          <a:noFill/>
+        </p:spPr>
+        <p:txBody>
+          <a:bodyPr wrap="square" rtlCol="0">
+            <a:spAutoFit/>
+          </a:bodyPr>
+          <a:lstStyle/>
+          <a:p>
+            <a:r>
+              <a:rPr lang="fr-FR" dirty="0"/>
+              <a:t>Ecran liste famille</a:t>
+            </a:r>
+          </a:p>
+        </p:txBody>
+      </p:sp>
+      <p:grpSp>
+        <p:nvGrpSpPr>
+          <p:cNvPr id="15" name="Groupe 14">
+            <a:extLst>
+              <a:ext uri="{FF2B5EF4-FFF2-40B4-BE49-F238E27FC236}">
+                <a16:creationId xmlns:a16="http://schemas.microsoft.com/office/drawing/2014/main" id="{9A65AC6B-EE23-4FA4-997F-3CD913CE2FD0}"/>
+              </a:ext>
+            </a:extLst>
+          </p:cNvPr>
+          <p:cNvGrpSpPr/>
+          <p:nvPr/>
+        </p:nvGrpSpPr>
+        <p:grpSpPr>
+          <a:xfrm>
+            <a:off x="755576" y="728700"/>
+            <a:ext cx="3960440" cy="5400600"/>
+            <a:chOff x="755576" y="728700"/>
+            <a:chExt cx="3960440" cy="5400600"/>
+          </a:xfrm>
+        </p:grpSpPr>
+        <p:grpSp>
+          <p:nvGrpSpPr>
+            <p:cNvPr id="5" name="Groupe 4">
+              <a:extLst>
+                <a:ext uri="{FF2B5EF4-FFF2-40B4-BE49-F238E27FC236}">
+                  <a16:creationId xmlns:a16="http://schemas.microsoft.com/office/drawing/2014/main" id="{52E4449B-6918-45D2-9AA4-7C3B1B5DFE50}"/>
+                </a:ext>
+              </a:extLst>
+            </p:cNvPr>
+            <p:cNvGrpSpPr/>
+            <p:nvPr/>
+          </p:nvGrpSpPr>
+          <p:grpSpPr>
+            <a:xfrm>
+              <a:off x="755576" y="728700"/>
+              <a:ext cx="3960440" cy="5400600"/>
+              <a:chOff x="755576" y="728700"/>
+              <a:chExt cx="3960440" cy="5400600"/>
+            </a:xfrm>
+          </p:grpSpPr>
+          <p:grpSp>
+            <p:nvGrpSpPr>
+              <p:cNvPr id="9" name="Groupe 8"/>
+              <p:cNvGrpSpPr/>
+              <p:nvPr/>
+            </p:nvGrpSpPr>
+            <p:grpSpPr>
+              <a:xfrm>
+                <a:off x="755576" y="728700"/>
+                <a:ext cx="3960440" cy="5400600"/>
+                <a:chOff x="755576" y="728700"/>
+                <a:chExt cx="3960440" cy="5400600"/>
+              </a:xfrm>
+            </p:grpSpPr>
+            <p:sp>
+              <p:nvSpPr>
+                <p:cNvPr id="4" name="Rectangle 3"/>
+                <p:cNvSpPr/>
+                <p:nvPr/>
+              </p:nvSpPr>
+              <p:spPr>
+                <a:xfrm>
+                  <a:off x="755576" y="728700"/>
+                  <a:ext cx="3960440" cy="5400600"/>
+                </a:xfrm>
+                <a:prstGeom prst="rect">
+                  <a:avLst/>
+                </a:prstGeom>
+                <a:ln>
+                  <a:solidFill>
+                    <a:schemeClr val="tx1"/>
+                  </a:solidFill>
+                </a:ln>
+              </p:spPr>
+              <p:style>
+                <a:lnRef idx="2">
+                  <a:schemeClr val="accent1">
+                    <a:shade val="50000"/>
+                  </a:schemeClr>
+                </a:lnRef>
+                <a:fillRef idx="1">
+                  <a:schemeClr val="accent1"/>
+                </a:fillRef>
+                <a:effectRef idx="0">
+                  <a:schemeClr val="accent1"/>
+                </a:effectRef>
+                <a:fontRef idx="minor">
+                  <a:schemeClr val="lt1"/>
+                </a:fontRef>
+              </p:style>
+              <p:txBody>
+                <a:bodyPr rtlCol="0" anchor="ctr"/>
+                <a:lstStyle/>
+                <a:p>
+                  <a:pPr algn="ctr"/>
+                  <a:endParaRPr lang="fr-FR"/>
+                </a:p>
+              </p:txBody>
+            </p:sp>
+            <p:sp>
+              <p:nvSpPr>
+                <p:cNvPr id="7" name="Rectangle 6"/>
+                <p:cNvSpPr/>
+                <p:nvPr/>
+              </p:nvSpPr>
+              <p:spPr>
+                <a:xfrm>
+                  <a:off x="755576" y="728700"/>
+                  <a:ext cx="3960440" cy="468052"/>
+                </a:xfrm>
+                <a:prstGeom prst="rect">
+                  <a:avLst/>
+                </a:prstGeom>
+                <a:solidFill>
+                  <a:schemeClr val="bg1"/>
+                </a:solidFill>
+                <a:ln>
+                  <a:solidFill>
+                    <a:schemeClr val="tx1"/>
+                  </a:solidFill>
+                </a:ln>
+              </p:spPr>
+              <p:style>
+                <a:lnRef idx="2">
+                  <a:schemeClr val="accent1">
+                    <a:shade val="50000"/>
+                  </a:schemeClr>
+                </a:lnRef>
+                <a:fillRef idx="1">
+                  <a:schemeClr val="accent1"/>
+                </a:fillRef>
+                <a:effectRef idx="0">
+                  <a:schemeClr val="accent1"/>
+                </a:effectRef>
+                <a:fontRef idx="minor">
+                  <a:schemeClr val="lt1"/>
+                </a:fontRef>
+              </p:style>
+              <p:txBody>
+                <a:bodyPr rtlCol="0" anchor="ctr"/>
+                <a:lstStyle/>
+                <a:p>
+                  <a:pPr algn="ctr"/>
+                  <a:endParaRPr lang="fr-FR"/>
+                </a:p>
+              </p:txBody>
+            </p:sp>
+            <p:sp>
+              <p:nvSpPr>
+                <p:cNvPr id="8" name="ZoneTexte 7"/>
+                <p:cNvSpPr txBox="1"/>
+                <p:nvPr/>
+              </p:nvSpPr>
+              <p:spPr>
+                <a:xfrm>
+                  <a:off x="755576" y="824226"/>
+                  <a:ext cx="936104" cy="276999"/>
+                </a:xfrm>
+                <a:prstGeom prst="rect">
+                  <a:avLst/>
+                </a:prstGeom>
+                <a:noFill/>
+              </p:spPr>
+              <p:txBody>
+                <a:bodyPr wrap="square" rtlCol="0">
+                  <a:spAutoFit/>
+                </a:bodyPr>
+                <a:lstStyle/>
+                <a:p>
+                  <a:pPr algn="ctr"/>
+                  <a:r>
+                    <a:rPr lang="fr-FR" sz="1200" dirty="0"/>
+                    <a:t>Accueil</a:t>
+                  </a:r>
+                </a:p>
+              </p:txBody>
+            </p:sp>
+          </p:grpSp>
+          <p:sp>
+            <p:nvSpPr>
+              <p:cNvPr id="2" name="Rectangle 1">
+                <a:extLst>
+                  <a:ext uri="{FF2B5EF4-FFF2-40B4-BE49-F238E27FC236}">
+                    <a16:creationId xmlns:a16="http://schemas.microsoft.com/office/drawing/2014/main" id="{8D0CE8A9-91AE-41BA-8A79-CAD11D04711F}"/>
+                  </a:ext>
+                </a:extLst>
+              </p:cNvPr>
+              <p:cNvSpPr/>
+              <p:nvPr/>
+            </p:nvSpPr>
+            <p:spPr>
+              <a:xfrm>
+                <a:off x="899592" y="1397000"/>
+                <a:ext cx="3672408" cy="4480272"/>
+              </a:xfrm>
+              <a:prstGeom prst="rect">
+                <a:avLst/>
+              </a:prstGeom>
+              <a:solidFill>
+                <a:schemeClr val="bg1"/>
+              </a:solidFill>
+              <a:ln>
+                <a:solidFill>
+                  <a:schemeClr val="tx1">
+                    <a:lumMod val="95000"/>
+                    <a:lumOff val="5000"/>
+                  </a:schemeClr>
+                </a:solidFill>
+              </a:ln>
+            </p:spPr>
+            <p:style>
+              <a:lnRef idx="2">
+                <a:schemeClr val="accent1">
+                  <a:shade val="50000"/>
+                </a:schemeClr>
+              </a:lnRef>
+              <a:fillRef idx="1">
+                <a:schemeClr val="accent1"/>
+              </a:fillRef>
+              <a:effectRef idx="0">
+                <a:schemeClr val="accent1"/>
+              </a:effectRef>
+              <a:fontRef idx="minor">
+                <a:schemeClr val="lt1"/>
+              </a:fontRef>
+            </p:style>
+            <p:txBody>
+              <a:bodyPr rtlCol="0" anchor="ctr"/>
+              <a:lstStyle/>
+              <a:p>
+                <a:pPr algn="ctr"/>
+                <a:endParaRPr lang="fr-FR"/>
+              </a:p>
+            </p:txBody>
+          </p:sp>
+        </p:grpSp>
+        <p:cxnSp>
+          <p:nvCxnSpPr>
+            <p:cNvPr id="13" name="Connecteur droit 12">
+              <a:extLst>
+                <a:ext uri="{FF2B5EF4-FFF2-40B4-BE49-F238E27FC236}">
+                  <a16:creationId xmlns:a16="http://schemas.microsoft.com/office/drawing/2014/main" id="{21394F91-921A-4BBF-B4EC-B63598DE040A}"/>
+                </a:ext>
+              </a:extLst>
+            </p:cNvPr>
+            <p:cNvCxnSpPr/>
+            <p:nvPr/>
+          </p:nvCxnSpPr>
+          <p:spPr>
+            <a:xfrm>
+              <a:off x="1115616" y="1988840"/>
+              <a:ext cx="3312368" cy="0"/>
+            </a:xfrm>
+            <a:prstGeom prst="line">
+              <a:avLst/>
+            </a:prstGeom>
+          </p:spPr>
+          <p:style>
+            <a:lnRef idx="1">
+              <a:schemeClr val="dk1"/>
+            </a:lnRef>
+            <a:fillRef idx="0">
+              <a:schemeClr val="dk1"/>
+            </a:fillRef>
+            <a:effectRef idx="0">
+              <a:schemeClr val="dk1"/>
+            </a:effectRef>
+            <a:fontRef idx="minor">
+              <a:schemeClr val="tx1"/>
+            </a:fontRef>
+          </p:style>
+        </p:cxnSp>
+        <p:sp>
+          <p:nvSpPr>
+            <p:cNvPr id="14" name="Rectangle : coins arrondis 13">
+              <a:extLst>
+                <a:ext uri="{FF2B5EF4-FFF2-40B4-BE49-F238E27FC236}">
+                  <a16:creationId xmlns:a16="http://schemas.microsoft.com/office/drawing/2014/main" id="{29329E08-603A-4562-9B04-3404D634631F}"/>
+                </a:ext>
+              </a:extLst>
+            </p:cNvPr>
+            <p:cNvSpPr/>
+            <p:nvPr/>
+          </p:nvSpPr>
+          <p:spPr>
+            <a:xfrm>
+              <a:off x="1619672" y="1484784"/>
+              <a:ext cx="2232248" cy="441340"/>
+            </a:xfrm>
+            <a:prstGeom prst="roundRect">
+              <a:avLst/>
+            </a:prstGeom>
+            <a:solidFill>
+              <a:schemeClr val="bg1">
+                <a:lumMod val="85000"/>
+              </a:schemeClr>
+            </a:solidFill>
+            <a:ln>
+              <a:noFill/>
+            </a:ln>
+            <a:effectLst/>
+          </p:spPr>
+          <p:style>
+            <a:lnRef idx="1">
+              <a:schemeClr val="dk1"/>
+            </a:lnRef>
+            <a:fillRef idx="2">
+              <a:schemeClr val="dk1"/>
+            </a:fillRef>
+            <a:effectRef idx="1">
+              <a:schemeClr val="dk1"/>
+            </a:effectRef>
+            <a:fontRef idx="minor">
+              <a:schemeClr val="dk1"/>
+            </a:fontRef>
+          </p:style>
+          <p:txBody>
+            <a:bodyPr rtlCol="0" anchor="ctr"/>
+            <a:lstStyle/>
+            <a:p>
+              <a:pPr algn="ctr"/>
+              <a:r>
+                <a:rPr lang="fr-FR" dirty="0"/>
+                <a:t>Liste des familles</a:t>
+              </a:r>
+            </a:p>
+          </p:txBody>
+        </p:sp>
+      </p:grpSp>
+      <p:graphicFrame>
+        <p:nvGraphicFramePr>
+          <p:cNvPr id="17" name="Tableau 11">
+            <a:extLst>
+              <a:ext uri="{FF2B5EF4-FFF2-40B4-BE49-F238E27FC236}">
+                <a16:creationId xmlns:a16="http://schemas.microsoft.com/office/drawing/2014/main" id="{A9D9493C-F037-4480-8E4A-70225C2F5D45}"/>
+              </a:ext>
+            </a:extLst>
+          </p:cNvPr>
+          <p:cNvGraphicFramePr>
+            <a:graphicFrameLocks noGrp="1"/>
+          </p:cNvGraphicFramePr>
+          <p:nvPr>
+            <p:extLst>
+              <p:ext uri="{D42A27DB-BD31-4B8C-83A1-F6EECF244321}">
+                <p14:modId xmlns:p14="http://schemas.microsoft.com/office/powerpoint/2010/main" val="1629675580"/>
+              </p:ext>
+            </p:extLst>
+          </p:nvPr>
+        </p:nvGraphicFramePr>
+        <p:xfrm>
+          <a:off x="1115616" y="2153335"/>
+          <a:ext cx="3312368" cy="213360"/>
+        </p:xfrm>
+        <a:graphic>
+          <a:graphicData uri="http://schemas.openxmlformats.org/drawingml/2006/table">
+            <a:tbl>
+              <a:tblPr firstRow="1" bandRow="1">
+                <a:tableStyleId>{5940675A-B579-460E-94D1-54222C63F5DA}</a:tableStyleId>
+              </a:tblPr>
+              <a:tblGrid>
+                <a:gridCol w="828092">
+                  <a:extLst>
+                    <a:ext uri="{9D8B030D-6E8A-4147-A177-3AD203B41FA5}">
+                      <a16:colId xmlns:a16="http://schemas.microsoft.com/office/drawing/2014/main" val="1107729764"/>
+                    </a:ext>
+                  </a:extLst>
+                </a:gridCol>
+                <a:gridCol w="828092">
+                  <a:extLst>
+                    <a:ext uri="{9D8B030D-6E8A-4147-A177-3AD203B41FA5}">
+                      <a16:colId xmlns:a16="http://schemas.microsoft.com/office/drawing/2014/main" val="1016315755"/>
+                    </a:ext>
+                  </a:extLst>
+                </a:gridCol>
+                <a:gridCol w="828092">
+                  <a:extLst>
+                    <a:ext uri="{9D8B030D-6E8A-4147-A177-3AD203B41FA5}">
+                      <a16:colId xmlns:a16="http://schemas.microsoft.com/office/drawing/2014/main" val="2123422907"/>
+                    </a:ext>
+                  </a:extLst>
+                </a:gridCol>
+                <a:gridCol w="828092">
+                  <a:extLst>
+                    <a:ext uri="{9D8B030D-6E8A-4147-A177-3AD203B41FA5}">
+                      <a16:colId xmlns:a16="http://schemas.microsoft.com/office/drawing/2014/main" val="3886583170"/>
+                    </a:ext>
+                  </a:extLst>
+                </a:gridCol>
+              </a:tblGrid>
+              <a:tr h="193514">
+                <a:tc>
+                  <a:txBody>
+                    <a:bodyPr/>
+                    <a:lstStyle/>
+                    <a:p>
+                      <a:r>
+                        <a:rPr lang="fr-FR" sz="800" dirty="0"/>
+                        <a:t>Id</a:t>
+                      </a:r>
+                    </a:p>
+                  </a:txBody>
+                  <a:tcPr/>
+                </a:tc>
+                <a:tc>
+                  <a:txBody>
+                    <a:bodyPr/>
+                    <a:lstStyle/>
+                    <a:p>
+                      <a:r>
+                        <a:rPr lang="fr-FR" sz="800" dirty="0"/>
+                        <a:t>Nom</a:t>
+                      </a:r>
+                    </a:p>
+                  </a:txBody>
+                  <a:tcPr/>
+                </a:tc>
+                <a:tc>
+                  <a:txBody>
+                    <a:bodyPr/>
+                    <a:lstStyle/>
+                    <a:p>
+                      <a:r>
+                        <a:rPr lang="fr-FR" sz="800" dirty="0"/>
+                        <a:t>Génération</a:t>
+                      </a:r>
+                    </a:p>
+                  </a:txBody>
+                  <a:tcPr/>
+                </a:tc>
+                <a:tc>
+                  <a:txBody>
+                    <a:bodyPr/>
+                    <a:lstStyle/>
+                    <a:p>
+                      <a:r>
+                        <a:rPr lang="fr-FR" sz="800" dirty="0"/>
+                        <a:t>Chef de famille</a:t>
+                      </a:r>
+                    </a:p>
+                  </a:txBody>
+                  <a:tcPr/>
+                </a:tc>
+                <a:extLst>
+                  <a:ext uri="{0D108BD9-81ED-4DB2-BD59-A6C34878D82A}">
+                    <a16:rowId xmlns:a16="http://schemas.microsoft.com/office/drawing/2014/main" val="1351064631"/>
+                  </a:ext>
+                </a:extLst>
+              </a:tr>
+            </a:tbl>
+          </a:graphicData>
+        </a:graphic>
+      </p:graphicFrame>
+      <p:sp>
+        <p:nvSpPr>
+          <p:cNvPr id="18" name="ZoneTexte 17">
+            <a:extLst>
+              <a:ext uri="{FF2B5EF4-FFF2-40B4-BE49-F238E27FC236}">
+                <a16:creationId xmlns:a16="http://schemas.microsoft.com/office/drawing/2014/main" id="{7C1848A9-9566-4B63-B978-51ED9A95B97F}"/>
+              </a:ext>
+            </a:extLst>
+          </p:cNvPr>
+          <p:cNvSpPr txBox="1"/>
+          <p:nvPr/>
+        </p:nvSpPr>
+        <p:spPr>
+          <a:xfrm>
+            <a:off x="1344454" y="824225"/>
+            <a:ext cx="936104" cy="276999"/>
+          </a:xfrm>
+          <a:prstGeom prst="rect">
+            <a:avLst/>
+          </a:prstGeom>
+          <a:noFill/>
+        </p:spPr>
+        <p:txBody>
+          <a:bodyPr wrap="square" rtlCol="0">
+            <a:spAutoFit/>
+          </a:bodyPr>
+          <a:lstStyle/>
+          <a:p>
+            <a:pPr algn="ctr"/>
+            <a:r>
+              <a:rPr lang="fr-FR" sz="1200" dirty="0"/>
+              <a:t>Famille</a:t>
+            </a:r>
+          </a:p>
+        </p:txBody>
+      </p:sp>
+    </p:spTree>
+    <p:extLst>
+      <p:ext uri="{BB962C8B-B14F-4D97-AF65-F5344CB8AC3E}">
+        <p14:creationId xmlns:p14="http://schemas.microsoft.com/office/powerpoint/2010/main" val="3006996470"/>
       </p:ext>
     </p:extLst>
   </p:cSld>

</xml_diff>

<commit_message>
[T012] Création des dto, service, WS
</commit_message>
<xml_diff>
--- a/src/main/resources/mq.pptx
+++ b/src/main/resources/mq.pptx
@@ -10,6 +10,7 @@
     <p:sldId id="258" r:id="rId4"/>
     <p:sldId id="259" r:id="rId5"/>
     <p:sldId id="260" r:id="rId6"/>
+    <p:sldId id="261" r:id="rId7"/>
   </p:sldIdLst>
   <p:sldSz cx="9144000" cy="6858000" type="screen4x3"/>
   <p:notesSz cx="6858000" cy="9144000"/>
@@ -6297,10 +6298,1304 @@
           <p:nvPr>
             <p:extLst>
               <p:ext uri="{D42A27DB-BD31-4B8C-83A1-F6EECF244321}">
-                <p14:modId xmlns:p14="http://schemas.microsoft.com/office/powerpoint/2010/main" val="1734683742"/>
+                <p14:modId xmlns:p14="http://schemas.microsoft.com/office/powerpoint/2010/main" val="1411172186"/>
               </p:ext>
             </p:extLst>
           </p:nvPr>
+        </p:nvGraphicFramePr>
+        <p:xfrm>
+          <a:off x="4932040" y="1397000"/>
+          <a:ext cx="3960440" cy="3053080"/>
+        </p:xfrm>
+        <a:graphic>
+          <a:graphicData uri="http://schemas.openxmlformats.org/drawingml/2006/table">
+            <a:tbl>
+              <a:tblPr firstRow="1" bandRow="1">
+                <a:tableStyleId>{5940675A-B579-460E-94D1-54222C63F5DA}</a:tableStyleId>
+              </a:tblPr>
+              <a:tblGrid>
+                <a:gridCol w="720080">
+                  <a:extLst>
+                    <a:ext uri="{9D8B030D-6E8A-4147-A177-3AD203B41FA5}">
+                      <a16:colId xmlns:a16="http://schemas.microsoft.com/office/drawing/2014/main" val="20000"/>
+                    </a:ext>
+                  </a:extLst>
+                </a:gridCol>
+                <a:gridCol w="3240360">
+                  <a:extLst>
+                    <a:ext uri="{9D8B030D-6E8A-4147-A177-3AD203B41FA5}">
+                      <a16:colId xmlns:a16="http://schemas.microsoft.com/office/drawing/2014/main" val="20001"/>
+                    </a:ext>
+                  </a:extLst>
+                </a:gridCol>
+              </a:tblGrid>
+              <a:tr h="370840">
+                <a:tc>
+                  <a:txBody>
+                    <a:bodyPr/>
+                    <a:lstStyle/>
+                    <a:p>
+                      <a:r>
+                        <a:rPr lang="fr-FR" sz="1200" dirty="0"/>
+                        <a:t>V1.0</a:t>
+                      </a:r>
+                    </a:p>
+                  </a:txBody>
+                  <a:tcPr/>
+                </a:tc>
+                <a:tc>
+                  <a:txBody>
+                    <a:bodyPr/>
+                    <a:lstStyle/>
+                    <a:p>
+                      <a:pPr marL="0" marR="0" indent="0" algn="l" defTabSz="914400" rtl="0" eaLnBrk="1" fontAlgn="auto" latinLnBrk="0" hangingPunct="1">
+                        <a:lnSpc>
+                          <a:spcPct val="100000"/>
+                        </a:lnSpc>
+                        <a:spcBef>
+                          <a:spcPts val="0"/>
+                        </a:spcBef>
+                        <a:spcAft>
+                          <a:spcPts val="0"/>
+                        </a:spcAft>
+                        <a:buClrTx/>
+                        <a:buSzTx/>
+                        <a:buFontTx/>
+                        <a:buNone/>
+                        <a:tabLst/>
+                        <a:defRPr/>
+                      </a:pPr>
+                      <a:r>
+                        <a:rPr lang="fr-FR" sz="1200" dirty="0"/>
+                        <a:t>T012 – Création de l’écran accueil</a:t>
+                      </a:r>
+                    </a:p>
+                    <a:p>
+                      <a:endParaRPr lang="fr-FR" sz="1200" dirty="0"/>
+                    </a:p>
+                  </a:txBody>
+                  <a:tcPr/>
+                </a:tc>
+                <a:extLst>
+                  <a:ext uri="{0D108BD9-81ED-4DB2-BD59-A6C34878D82A}">
+                    <a16:rowId xmlns:a16="http://schemas.microsoft.com/office/drawing/2014/main" val="10000"/>
+                  </a:ext>
+                </a:extLst>
+              </a:tr>
+              <a:tr h="370840">
+                <a:tc>
+                  <a:txBody>
+                    <a:bodyPr/>
+                    <a:lstStyle/>
+                    <a:p>
+                      <a:endParaRPr lang="fr-FR" sz="1200"/>
+                    </a:p>
+                  </a:txBody>
+                  <a:tcPr/>
+                </a:tc>
+                <a:tc>
+                  <a:txBody>
+                    <a:bodyPr/>
+                    <a:lstStyle/>
+                    <a:p>
+                      <a:endParaRPr lang="fr-FR" sz="1200"/>
+                    </a:p>
+                  </a:txBody>
+                  <a:tcPr/>
+                </a:tc>
+                <a:extLst>
+                  <a:ext uri="{0D108BD9-81ED-4DB2-BD59-A6C34878D82A}">
+                    <a16:rowId xmlns:a16="http://schemas.microsoft.com/office/drawing/2014/main" val="10001"/>
+                  </a:ext>
+                </a:extLst>
+              </a:tr>
+              <a:tr h="370840">
+                <a:tc>
+                  <a:txBody>
+                    <a:bodyPr/>
+                    <a:lstStyle/>
+                    <a:p>
+                      <a:endParaRPr lang="fr-FR" sz="1200"/>
+                    </a:p>
+                  </a:txBody>
+                  <a:tcPr/>
+                </a:tc>
+                <a:tc>
+                  <a:txBody>
+                    <a:bodyPr/>
+                    <a:lstStyle/>
+                    <a:p>
+                      <a:endParaRPr lang="fr-FR" sz="1200" dirty="0"/>
+                    </a:p>
+                  </a:txBody>
+                  <a:tcPr/>
+                </a:tc>
+                <a:extLst>
+                  <a:ext uri="{0D108BD9-81ED-4DB2-BD59-A6C34878D82A}">
+                    <a16:rowId xmlns:a16="http://schemas.microsoft.com/office/drawing/2014/main" val="10002"/>
+                  </a:ext>
+                </a:extLst>
+              </a:tr>
+              <a:tr h="370840">
+                <a:tc>
+                  <a:txBody>
+                    <a:bodyPr/>
+                    <a:lstStyle/>
+                    <a:p>
+                      <a:endParaRPr lang="fr-FR" sz="1200"/>
+                    </a:p>
+                  </a:txBody>
+                  <a:tcPr/>
+                </a:tc>
+                <a:tc>
+                  <a:txBody>
+                    <a:bodyPr/>
+                    <a:lstStyle/>
+                    <a:p>
+                      <a:endParaRPr lang="fr-FR" sz="1200"/>
+                    </a:p>
+                  </a:txBody>
+                  <a:tcPr/>
+                </a:tc>
+                <a:extLst>
+                  <a:ext uri="{0D108BD9-81ED-4DB2-BD59-A6C34878D82A}">
+                    <a16:rowId xmlns:a16="http://schemas.microsoft.com/office/drawing/2014/main" val="10003"/>
+                  </a:ext>
+                </a:extLst>
+              </a:tr>
+              <a:tr h="370840">
+                <a:tc>
+                  <a:txBody>
+                    <a:bodyPr/>
+                    <a:lstStyle/>
+                    <a:p>
+                      <a:endParaRPr lang="fr-FR" sz="1200"/>
+                    </a:p>
+                  </a:txBody>
+                  <a:tcPr/>
+                </a:tc>
+                <a:tc>
+                  <a:txBody>
+                    <a:bodyPr/>
+                    <a:lstStyle/>
+                    <a:p>
+                      <a:endParaRPr lang="fr-FR" sz="1200"/>
+                    </a:p>
+                  </a:txBody>
+                  <a:tcPr/>
+                </a:tc>
+                <a:extLst>
+                  <a:ext uri="{0D108BD9-81ED-4DB2-BD59-A6C34878D82A}">
+                    <a16:rowId xmlns:a16="http://schemas.microsoft.com/office/drawing/2014/main" val="10004"/>
+                  </a:ext>
+                </a:extLst>
+              </a:tr>
+              <a:tr h="370840">
+                <a:tc>
+                  <a:txBody>
+                    <a:bodyPr/>
+                    <a:lstStyle/>
+                    <a:p>
+                      <a:endParaRPr lang="fr-FR" sz="1200"/>
+                    </a:p>
+                  </a:txBody>
+                  <a:tcPr/>
+                </a:tc>
+                <a:tc>
+                  <a:txBody>
+                    <a:bodyPr/>
+                    <a:lstStyle/>
+                    <a:p>
+                      <a:endParaRPr lang="fr-FR" sz="1200"/>
+                    </a:p>
+                  </a:txBody>
+                  <a:tcPr/>
+                </a:tc>
+                <a:extLst>
+                  <a:ext uri="{0D108BD9-81ED-4DB2-BD59-A6C34878D82A}">
+                    <a16:rowId xmlns:a16="http://schemas.microsoft.com/office/drawing/2014/main" val="10005"/>
+                  </a:ext>
+                </a:extLst>
+              </a:tr>
+              <a:tr h="370840">
+                <a:tc>
+                  <a:txBody>
+                    <a:bodyPr/>
+                    <a:lstStyle/>
+                    <a:p>
+                      <a:endParaRPr lang="fr-FR" sz="1200"/>
+                    </a:p>
+                  </a:txBody>
+                  <a:tcPr/>
+                </a:tc>
+                <a:tc>
+                  <a:txBody>
+                    <a:bodyPr/>
+                    <a:lstStyle/>
+                    <a:p>
+                      <a:endParaRPr lang="fr-FR" sz="1200"/>
+                    </a:p>
+                  </a:txBody>
+                  <a:tcPr/>
+                </a:tc>
+                <a:extLst>
+                  <a:ext uri="{0D108BD9-81ED-4DB2-BD59-A6C34878D82A}">
+                    <a16:rowId xmlns:a16="http://schemas.microsoft.com/office/drawing/2014/main" val="10006"/>
+                  </a:ext>
+                </a:extLst>
+              </a:tr>
+              <a:tr h="370840">
+                <a:tc>
+                  <a:txBody>
+                    <a:bodyPr/>
+                    <a:lstStyle/>
+                    <a:p>
+                      <a:endParaRPr lang="fr-FR" sz="1200"/>
+                    </a:p>
+                  </a:txBody>
+                  <a:tcPr/>
+                </a:tc>
+                <a:tc>
+                  <a:txBody>
+                    <a:bodyPr/>
+                    <a:lstStyle/>
+                    <a:p>
+                      <a:endParaRPr lang="fr-FR" sz="1200" dirty="0"/>
+                    </a:p>
+                  </a:txBody>
+                  <a:tcPr/>
+                </a:tc>
+                <a:extLst>
+                  <a:ext uri="{0D108BD9-81ED-4DB2-BD59-A6C34878D82A}">
+                    <a16:rowId xmlns:a16="http://schemas.microsoft.com/office/drawing/2014/main" val="10007"/>
+                  </a:ext>
+                </a:extLst>
+              </a:tr>
+            </a:tbl>
+          </a:graphicData>
+        </a:graphic>
+      </p:graphicFrame>
+      <p:sp>
+        <p:nvSpPr>
+          <p:cNvPr id="10" name="ZoneTexte 9">
+            <a:extLst>
+              <a:ext uri="{FF2B5EF4-FFF2-40B4-BE49-F238E27FC236}">
+                <a16:creationId xmlns:a16="http://schemas.microsoft.com/office/drawing/2014/main" id="{B08D4C3C-8EAE-49D8-A58A-BE3C4E499318}"/>
+              </a:ext>
+            </a:extLst>
+          </p:cNvPr>
+          <p:cNvSpPr txBox="1"/>
+          <p:nvPr/>
+        </p:nvSpPr>
+        <p:spPr>
+          <a:xfrm>
+            <a:off x="5220072" y="260648"/>
+            <a:ext cx="2808312" cy="369332"/>
+          </a:xfrm>
+          <a:prstGeom prst="rect">
+            <a:avLst/>
+          </a:prstGeom>
+          <a:noFill/>
+        </p:spPr>
+        <p:txBody>
+          <a:bodyPr wrap="square" rtlCol="0">
+            <a:spAutoFit/>
+          </a:bodyPr>
+          <a:lstStyle/>
+          <a:p>
+            <a:r>
+              <a:rPr lang="fr-FR" dirty="0"/>
+              <a:t>Ecran accueil</a:t>
+            </a:r>
+          </a:p>
+        </p:txBody>
+      </p:sp>
+      <p:grpSp>
+        <p:nvGrpSpPr>
+          <p:cNvPr id="15" name="Groupe 14">
+            <a:extLst>
+              <a:ext uri="{FF2B5EF4-FFF2-40B4-BE49-F238E27FC236}">
+                <a16:creationId xmlns:a16="http://schemas.microsoft.com/office/drawing/2014/main" id="{9A65AC6B-EE23-4FA4-997F-3CD913CE2FD0}"/>
+              </a:ext>
+            </a:extLst>
+          </p:cNvPr>
+          <p:cNvGrpSpPr/>
+          <p:nvPr/>
+        </p:nvGrpSpPr>
+        <p:grpSpPr>
+          <a:xfrm>
+            <a:off x="755576" y="728700"/>
+            <a:ext cx="3960440" cy="5400600"/>
+            <a:chOff x="755576" y="728700"/>
+            <a:chExt cx="3960440" cy="5400600"/>
+          </a:xfrm>
+        </p:grpSpPr>
+        <p:grpSp>
+          <p:nvGrpSpPr>
+            <p:cNvPr id="5" name="Groupe 4">
+              <a:extLst>
+                <a:ext uri="{FF2B5EF4-FFF2-40B4-BE49-F238E27FC236}">
+                  <a16:creationId xmlns:a16="http://schemas.microsoft.com/office/drawing/2014/main" id="{52E4449B-6918-45D2-9AA4-7C3B1B5DFE50}"/>
+                </a:ext>
+              </a:extLst>
+            </p:cNvPr>
+            <p:cNvGrpSpPr/>
+            <p:nvPr/>
+          </p:nvGrpSpPr>
+          <p:grpSpPr>
+            <a:xfrm>
+              <a:off x="755576" y="728700"/>
+              <a:ext cx="3960440" cy="5400600"/>
+              <a:chOff x="755576" y="728700"/>
+              <a:chExt cx="3960440" cy="5400600"/>
+            </a:xfrm>
+          </p:grpSpPr>
+          <p:grpSp>
+            <p:nvGrpSpPr>
+              <p:cNvPr id="9" name="Groupe 8"/>
+              <p:cNvGrpSpPr/>
+              <p:nvPr/>
+            </p:nvGrpSpPr>
+            <p:grpSpPr>
+              <a:xfrm>
+                <a:off x="755576" y="728700"/>
+                <a:ext cx="3960440" cy="5400600"/>
+                <a:chOff x="755576" y="728700"/>
+                <a:chExt cx="3960440" cy="5400600"/>
+              </a:xfrm>
+            </p:grpSpPr>
+            <p:sp>
+              <p:nvSpPr>
+                <p:cNvPr id="4" name="Rectangle 3"/>
+                <p:cNvSpPr/>
+                <p:nvPr/>
+              </p:nvSpPr>
+              <p:spPr>
+                <a:xfrm>
+                  <a:off x="755576" y="728700"/>
+                  <a:ext cx="3960440" cy="5400600"/>
+                </a:xfrm>
+                <a:prstGeom prst="rect">
+                  <a:avLst/>
+                </a:prstGeom>
+                <a:ln>
+                  <a:solidFill>
+                    <a:schemeClr val="tx1"/>
+                  </a:solidFill>
+                </a:ln>
+              </p:spPr>
+              <p:style>
+                <a:lnRef idx="2">
+                  <a:schemeClr val="accent1">
+                    <a:shade val="50000"/>
+                  </a:schemeClr>
+                </a:lnRef>
+                <a:fillRef idx="1">
+                  <a:schemeClr val="accent1"/>
+                </a:fillRef>
+                <a:effectRef idx="0">
+                  <a:schemeClr val="accent1"/>
+                </a:effectRef>
+                <a:fontRef idx="minor">
+                  <a:schemeClr val="lt1"/>
+                </a:fontRef>
+              </p:style>
+              <p:txBody>
+                <a:bodyPr rtlCol="0" anchor="ctr"/>
+                <a:lstStyle/>
+                <a:p>
+                  <a:pPr algn="ctr"/>
+                  <a:endParaRPr lang="fr-FR"/>
+                </a:p>
+              </p:txBody>
+            </p:sp>
+            <p:sp>
+              <p:nvSpPr>
+                <p:cNvPr id="7" name="Rectangle 6"/>
+                <p:cNvSpPr/>
+                <p:nvPr/>
+              </p:nvSpPr>
+              <p:spPr>
+                <a:xfrm>
+                  <a:off x="755576" y="728700"/>
+                  <a:ext cx="3960440" cy="468052"/>
+                </a:xfrm>
+                <a:prstGeom prst="rect">
+                  <a:avLst/>
+                </a:prstGeom>
+                <a:solidFill>
+                  <a:schemeClr val="bg1"/>
+                </a:solidFill>
+                <a:ln>
+                  <a:solidFill>
+                    <a:schemeClr val="tx1"/>
+                  </a:solidFill>
+                </a:ln>
+              </p:spPr>
+              <p:style>
+                <a:lnRef idx="2">
+                  <a:schemeClr val="accent1">
+                    <a:shade val="50000"/>
+                  </a:schemeClr>
+                </a:lnRef>
+                <a:fillRef idx="1">
+                  <a:schemeClr val="accent1"/>
+                </a:fillRef>
+                <a:effectRef idx="0">
+                  <a:schemeClr val="accent1"/>
+                </a:effectRef>
+                <a:fontRef idx="minor">
+                  <a:schemeClr val="lt1"/>
+                </a:fontRef>
+              </p:style>
+              <p:txBody>
+                <a:bodyPr rtlCol="0" anchor="ctr"/>
+                <a:lstStyle/>
+                <a:p>
+                  <a:pPr algn="ctr"/>
+                  <a:endParaRPr lang="fr-FR"/>
+                </a:p>
+              </p:txBody>
+            </p:sp>
+            <p:sp>
+              <p:nvSpPr>
+                <p:cNvPr id="8" name="ZoneTexte 7"/>
+                <p:cNvSpPr txBox="1"/>
+                <p:nvPr/>
+              </p:nvSpPr>
+              <p:spPr>
+                <a:xfrm>
+                  <a:off x="755576" y="824226"/>
+                  <a:ext cx="936104" cy="276999"/>
+                </a:xfrm>
+                <a:prstGeom prst="rect">
+                  <a:avLst/>
+                </a:prstGeom>
+                <a:noFill/>
+              </p:spPr>
+              <p:txBody>
+                <a:bodyPr wrap="square" rtlCol="0">
+                  <a:spAutoFit/>
+                </a:bodyPr>
+                <a:lstStyle/>
+                <a:p>
+                  <a:pPr algn="ctr"/>
+                  <a:r>
+                    <a:rPr lang="fr-FR" sz="1200" dirty="0"/>
+                    <a:t>Accueil</a:t>
+                  </a:r>
+                </a:p>
+              </p:txBody>
+            </p:sp>
+          </p:grpSp>
+          <p:sp>
+            <p:nvSpPr>
+              <p:cNvPr id="2" name="Rectangle 1">
+                <a:extLst>
+                  <a:ext uri="{FF2B5EF4-FFF2-40B4-BE49-F238E27FC236}">
+                    <a16:creationId xmlns:a16="http://schemas.microsoft.com/office/drawing/2014/main" id="{8D0CE8A9-91AE-41BA-8A79-CAD11D04711F}"/>
+                  </a:ext>
+                </a:extLst>
+              </p:cNvPr>
+              <p:cNvSpPr/>
+              <p:nvPr/>
+            </p:nvSpPr>
+            <p:spPr>
+              <a:xfrm>
+                <a:off x="899592" y="1397000"/>
+                <a:ext cx="3672408" cy="4480272"/>
+              </a:xfrm>
+              <a:prstGeom prst="rect">
+                <a:avLst/>
+              </a:prstGeom>
+              <a:solidFill>
+                <a:schemeClr val="bg1"/>
+              </a:solidFill>
+              <a:ln>
+                <a:solidFill>
+                  <a:schemeClr val="tx1">
+                    <a:lumMod val="95000"/>
+                    <a:lumOff val="5000"/>
+                  </a:schemeClr>
+                </a:solidFill>
+              </a:ln>
+            </p:spPr>
+            <p:style>
+              <a:lnRef idx="2">
+                <a:schemeClr val="accent1">
+                  <a:shade val="50000"/>
+                </a:schemeClr>
+              </a:lnRef>
+              <a:fillRef idx="1">
+                <a:schemeClr val="accent1"/>
+              </a:fillRef>
+              <a:effectRef idx="0">
+                <a:schemeClr val="accent1"/>
+              </a:effectRef>
+              <a:fontRef idx="minor">
+                <a:schemeClr val="lt1"/>
+              </a:fontRef>
+            </p:style>
+            <p:txBody>
+              <a:bodyPr rtlCol="0" anchor="ctr"/>
+              <a:lstStyle/>
+              <a:p>
+                <a:pPr algn="ctr"/>
+                <a:r>
+                  <a:rPr lang="fr-FR" dirty="0"/>
+                  <a:t>+++++++++++++++++++++++</a:t>
+                </a:r>
+              </a:p>
+            </p:txBody>
+          </p:sp>
+        </p:grpSp>
+        <p:cxnSp>
+          <p:nvCxnSpPr>
+            <p:cNvPr id="13" name="Connecteur droit 12">
+              <a:extLst>
+                <a:ext uri="{FF2B5EF4-FFF2-40B4-BE49-F238E27FC236}">
+                  <a16:creationId xmlns:a16="http://schemas.microsoft.com/office/drawing/2014/main" id="{21394F91-921A-4BBF-B4EC-B63598DE040A}"/>
+                </a:ext>
+              </a:extLst>
+            </p:cNvPr>
+            <p:cNvCxnSpPr/>
+            <p:nvPr/>
+          </p:nvCxnSpPr>
+          <p:spPr>
+            <a:xfrm>
+              <a:off x="1115616" y="1988840"/>
+              <a:ext cx="3312368" cy="0"/>
+            </a:xfrm>
+            <a:prstGeom prst="line">
+              <a:avLst/>
+            </a:prstGeom>
+          </p:spPr>
+          <p:style>
+            <a:lnRef idx="1">
+              <a:schemeClr val="dk1"/>
+            </a:lnRef>
+            <a:fillRef idx="0">
+              <a:schemeClr val="dk1"/>
+            </a:fillRef>
+            <a:effectRef idx="0">
+              <a:schemeClr val="dk1"/>
+            </a:effectRef>
+            <a:fontRef idx="minor">
+              <a:schemeClr val="tx1"/>
+            </a:fontRef>
+          </p:style>
+        </p:cxnSp>
+        <p:sp>
+          <p:nvSpPr>
+            <p:cNvPr id="14" name="Rectangle : coins arrondis 13">
+              <a:extLst>
+                <a:ext uri="{FF2B5EF4-FFF2-40B4-BE49-F238E27FC236}">
+                  <a16:creationId xmlns:a16="http://schemas.microsoft.com/office/drawing/2014/main" id="{29329E08-603A-4562-9B04-3404D634631F}"/>
+                </a:ext>
+              </a:extLst>
+            </p:cNvPr>
+            <p:cNvSpPr/>
+            <p:nvPr/>
+          </p:nvSpPr>
+          <p:spPr>
+            <a:xfrm>
+              <a:off x="1619672" y="1484784"/>
+              <a:ext cx="2232248" cy="441340"/>
+            </a:xfrm>
+            <a:prstGeom prst="roundRect">
+              <a:avLst/>
+            </a:prstGeom>
+            <a:solidFill>
+              <a:schemeClr val="bg1">
+                <a:lumMod val="85000"/>
+              </a:schemeClr>
+            </a:solidFill>
+            <a:ln>
+              <a:noFill/>
+            </a:ln>
+            <a:effectLst/>
+          </p:spPr>
+          <p:style>
+            <a:lnRef idx="1">
+              <a:schemeClr val="dk1"/>
+            </a:lnRef>
+            <a:fillRef idx="2">
+              <a:schemeClr val="dk1"/>
+            </a:fillRef>
+            <a:effectRef idx="1">
+              <a:schemeClr val="dk1"/>
+            </a:effectRef>
+            <a:fontRef idx="minor">
+              <a:schemeClr val="dk1"/>
+            </a:fontRef>
+          </p:style>
+          <p:txBody>
+            <a:bodyPr rtlCol="0" anchor="ctr"/>
+            <a:lstStyle/>
+            <a:p>
+              <a:pPr algn="ctr"/>
+              <a:r>
+                <a:rPr lang="fr-FR" dirty="0" err="1"/>
+                <a:t>Elba</a:t>
+              </a:r>
+              <a:r>
+                <a:rPr lang="fr-FR" dirty="0"/>
+                <a:t> City</a:t>
+              </a:r>
+            </a:p>
+          </p:txBody>
+        </p:sp>
+      </p:grpSp>
+      <p:sp>
+        <p:nvSpPr>
+          <p:cNvPr id="18" name="ZoneTexte 17">
+            <a:extLst>
+              <a:ext uri="{FF2B5EF4-FFF2-40B4-BE49-F238E27FC236}">
+                <a16:creationId xmlns:a16="http://schemas.microsoft.com/office/drawing/2014/main" id="{7C1848A9-9566-4B63-B978-51ED9A95B97F}"/>
+              </a:ext>
+            </a:extLst>
+          </p:cNvPr>
+          <p:cNvSpPr txBox="1"/>
+          <p:nvPr/>
+        </p:nvSpPr>
+        <p:spPr>
+          <a:xfrm>
+            <a:off x="1344454" y="824225"/>
+            <a:ext cx="936104" cy="276999"/>
+          </a:xfrm>
+          <a:prstGeom prst="rect">
+            <a:avLst/>
+          </a:prstGeom>
+          <a:noFill/>
+        </p:spPr>
+        <p:txBody>
+          <a:bodyPr wrap="square" rtlCol="0">
+            <a:spAutoFit/>
+          </a:bodyPr>
+          <a:lstStyle/>
+          <a:p>
+            <a:pPr algn="ctr"/>
+            <a:r>
+              <a:rPr lang="fr-FR" sz="1200" dirty="0"/>
+              <a:t>Famille</a:t>
+            </a:r>
+          </a:p>
+        </p:txBody>
+      </p:sp>
+      <p:sp>
+        <p:nvSpPr>
+          <p:cNvPr id="16" name="ZoneTexte 15">
+            <a:extLst>
+              <a:ext uri="{FF2B5EF4-FFF2-40B4-BE49-F238E27FC236}">
+                <a16:creationId xmlns:a16="http://schemas.microsoft.com/office/drawing/2014/main" id="{136A64E8-6660-4C63-8D96-023C21BBEABF}"/>
+              </a:ext>
+            </a:extLst>
+          </p:cNvPr>
+          <p:cNvSpPr txBox="1"/>
+          <p:nvPr/>
+        </p:nvSpPr>
+        <p:spPr>
+          <a:xfrm>
+            <a:off x="881832" y="2176344"/>
+            <a:ext cx="3240360" cy="400110"/>
+          </a:xfrm>
+          <a:prstGeom prst="rect">
+            <a:avLst/>
+          </a:prstGeom>
+          <a:noFill/>
+        </p:spPr>
+        <p:txBody>
+          <a:bodyPr wrap="square" rtlCol="0">
+            <a:spAutoFit/>
+          </a:bodyPr>
+          <a:lstStyle/>
+          <a:p>
+            <a:r>
+              <a:rPr lang="fr-FR" sz="1000" dirty="0"/>
+              <a:t>Famille :</a:t>
+            </a:r>
+          </a:p>
+          <a:p>
+            <a:endParaRPr lang="fr-FR" sz="1000" dirty="0"/>
+          </a:p>
+        </p:txBody>
+      </p:sp>
+      <p:graphicFrame>
+        <p:nvGraphicFramePr>
+          <p:cNvPr id="3" name="Tableau 10">
+            <a:extLst>
+              <a:ext uri="{FF2B5EF4-FFF2-40B4-BE49-F238E27FC236}">
+                <a16:creationId xmlns:a16="http://schemas.microsoft.com/office/drawing/2014/main" id="{6252C87F-FC3B-4ECA-A117-9766FACB091C}"/>
+              </a:ext>
+            </a:extLst>
+          </p:cNvPr>
+          <p:cNvGraphicFramePr>
+            <a:graphicFrameLocks noGrp="1"/>
+          </p:cNvGraphicFramePr>
+          <p:nvPr>
+            <p:extLst>
+              <p:ext uri="{D42A27DB-BD31-4B8C-83A1-F6EECF244321}">
+                <p14:modId xmlns:p14="http://schemas.microsoft.com/office/powerpoint/2010/main" val="514486159"/>
+              </p:ext>
+            </p:extLst>
+          </p:nvPr>
+        </p:nvGraphicFramePr>
+        <p:xfrm>
+          <a:off x="1187624" y="2486829"/>
+          <a:ext cx="3060824" cy="1554480"/>
+        </p:xfrm>
+        <a:graphic>
+          <a:graphicData uri="http://schemas.openxmlformats.org/drawingml/2006/table">
+            <a:tbl>
+              <a:tblPr firstRow="1" bandRow="1">
+                <a:tableStyleId>{5940675A-B579-460E-94D1-54222C63F5DA}</a:tableStyleId>
+              </a:tblPr>
+              <a:tblGrid>
+                <a:gridCol w="1530412">
+                  <a:extLst>
+                    <a:ext uri="{9D8B030D-6E8A-4147-A177-3AD203B41FA5}">
+                      <a16:colId xmlns:a16="http://schemas.microsoft.com/office/drawing/2014/main" val="3586916827"/>
+                    </a:ext>
+                  </a:extLst>
+                </a:gridCol>
+                <a:gridCol w="1530412">
+                  <a:extLst>
+                    <a:ext uri="{9D8B030D-6E8A-4147-A177-3AD203B41FA5}">
+                      <a16:colId xmlns:a16="http://schemas.microsoft.com/office/drawing/2014/main" val="1066306485"/>
+                    </a:ext>
+                  </a:extLst>
+                </a:gridCol>
+              </a:tblGrid>
+              <a:tr h="155504">
+                <a:tc>
+                  <a:txBody>
+                    <a:bodyPr/>
+                    <a:lstStyle/>
+                    <a:p>
+                      <a:r>
+                        <a:rPr lang="fr-FR" sz="800" dirty="0"/>
+                        <a:t>Nom</a:t>
+                      </a:r>
+                    </a:p>
+                  </a:txBody>
+                  <a:tcPr/>
+                </a:tc>
+                <a:tc>
+                  <a:txBody>
+                    <a:bodyPr/>
+                    <a:lstStyle/>
+                    <a:p>
+                      <a:r>
+                        <a:rPr lang="fr-FR" sz="800" dirty="0"/>
+                        <a:t>{</a:t>
+                      </a:r>
+                      <a:r>
+                        <a:rPr lang="fr-FR" sz="800" dirty="0" err="1"/>
+                        <a:t>famille.nom</a:t>
+                      </a:r>
+                      <a:r>
+                        <a:rPr lang="fr-FR" sz="800" dirty="0"/>
+                        <a:t>}</a:t>
+                      </a:r>
+                    </a:p>
+                  </a:txBody>
+                  <a:tcPr/>
+                </a:tc>
+                <a:extLst>
+                  <a:ext uri="{0D108BD9-81ED-4DB2-BD59-A6C34878D82A}">
+                    <a16:rowId xmlns:a16="http://schemas.microsoft.com/office/drawing/2014/main" val="2540838935"/>
+                  </a:ext>
+                </a:extLst>
+              </a:tr>
+              <a:tr h="155504">
+                <a:tc>
+                  <a:txBody>
+                    <a:bodyPr/>
+                    <a:lstStyle/>
+                    <a:p>
+                      <a:r>
+                        <a:rPr lang="fr-FR" sz="800" dirty="0"/>
+                        <a:t>Classe</a:t>
+                      </a:r>
+                    </a:p>
+                  </a:txBody>
+                  <a:tcPr/>
+                </a:tc>
+                <a:tc>
+                  <a:txBody>
+                    <a:bodyPr/>
+                    <a:lstStyle/>
+                    <a:p>
+                      <a:r>
+                        <a:rPr lang="fr-FR" sz="800" dirty="0"/>
+                        <a:t>{vide}</a:t>
+                      </a:r>
+                    </a:p>
+                  </a:txBody>
+                  <a:tcPr/>
+                </a:tc>
+                <a:extLst>
+                  <a:ext uri="{0D108BD9-81ED-4DB2-BD59-A6C34878D82A}">
+                    <a16:rowId xmlns:a16="http://schemas.microsoft.com/office/drawing/2014/main" val="469124120"/>
+                  </a:ext>
+                </a:extLst>
+              </a:tr>
+              <a:tr h="155504">
+                <a:tc>
+                  <a:txBody>
+                    <a:bodyPr/>
+                    <a:lstStyle/>
+                    <a:p>
+                      <a:r>
+                        <a:rPr lang="fr-FR" sz="800" dirty="0"/>
+                        <a:t>Génération</a:t>
+                      </a:r>
+                    </a:p>
+                  </a:txBody>
+                  <a:tcPr/>
+                </a:tc>
+                <a:tc>
+                  <a:txBody>
+                    <a:bodyPr/>
+                    <a:lstStyle/>
+                    <a:p>
+                      <a:r>
+                        <a:rPr lang="fr-FR" sz="800" dirty="0"/>
+                        <a:t>{</a:t>
+                      </a:r>
+                      <a:r>
+                        <a:rPr lang="fr-FR" sz="800" dirty="0" err="1"/>
+                        <a:t>famille.generation</a:t>
+                      </a:r>
+                      <a:r>
+                        <a:rPr lang="fr-FR" sz="800" dirty="0"/>
+                        <a:t>}</a:t>
+                      </a:r>
+                    </a:p>
+                  </a:txBody>
+                  <a:tcPr/>
+                </a:tc>
+                <a:extLst>
+                  <a:ext uri="{0D108BD9-81ED-4DB2-BD59-A6C34878D82A}">
+                    <a16:rowId xmlns:a16="http://schemas.microsoft.com/office/drawing/2014/main" val="3282643880"/>
+                  </a:ext>
+                </a:extLst>
+              </a:tr>
+              <a:tr h="155504">
+                <a:tc>
+                  <a:txBody>
+                    <a:bodyPr/>
+                    <a:lstStyle/>
+                    <a:p>
+                      <a:r>
+                        <a:rPr lang="fr-FR" sz="800" dirty="0"/>
+                        <a:t>Chef de famille</a:t>
+                      </a:r>
+                    </a:p>
+                  </a:txBody>
+                  <a:tcPr/>
+                </a:tc>
+                <a:tc>
+                  <a:txBody>
+                    <a:bodyPr/>
+                    <a:lstStyle/>
+                    <a:p>
+                      <a:pPr marL="0" marR="0" lvl="0" indent="0" algn="l" defTabSz="914400" rtl="0" eaLnBrk="1" fontAlgn="auto" latinLnBrk="0" hangingPunct="1">
+                        <a:lnSpc>
+                          <a:spcPct val="100000"/>
+                        </a:lnSpc>
+                        <a:spcBef>
+                          <a:spcPts val="0"/>
+                        </a:spcBef>
+                        <a:spcAft>
+                          <a:spcPts val="0"/>
+                        </a:spcAft>
+                        <a:buClrTx/>
+                        <a:buSzTx/>
+                        <a:buFontTx/>
+                        <a:buNone/>
+                        <a:tabLst/>
+                        <a:defRPr/>
+                      </a:pPr>
+                      <a:r>
+                        <a:rPr lang="fr-FR" sz="800" dirty="0"/>
+                        <a:t>{</a:t>
+                      </a:r>
+                      <a:r>
+                        <a:rPr lang="fr-FR" sz="800" dirty="0" err="1"/>
+                        <a:t>famille.chef.prenom</a:t>
+                      </a:r>
+                      <a:r>
+                        <a:rPr lang="fr-FR" sz="800" dirty="0"/>
+                        <a:t>} {</a:t>
+                      </a:r>
+                      <a:r>
+                        <a:rPr lang="fr-FR" sz="800" dirty="0" err="1"/>
+                        <a:t>famille.chef.nom</a:t>
+                      </a:r>
+                      <a:r>
+                        <a:rPr lang="fr-FR" sz="800" dirty="0"/>
+                        <a:t>}</a:t>
+                      </a:r>
+                    </a:p>
+                  </a:txBody>
+                  <a:tcPr/>
+                </a:tc>
+                <a:extLst>
+                  <a:ext uri="{0D108BD9-81ED-4DB2-BD59-A6C34878D82A}">
+                    <a16:rowId xmlns:a16="http://schemas.microsoft.com/office/drawing/2014/main" val="2915539893"/>
+                  </a:ext>
+                </a:extLst>
+              </a:tr>
+              <a:tr h="191267">
+                <a:tc>
+                  <a:txBody>
+                    <a:bodyPr/>
+                    <a:lstStyle/>
+                    <a:p>
+                      <a:r>
+                        <a:rPr lang="fr-FR" sz="800" dirty="0"/>
+                        <a:t>Conjoint</a:t>
+                      </a:r>
+                    </a:p>
+                  </a:txBody>
+                  <a:tcPr/>
+                </a:tc>
+                <a:tc>
+                  <a:txBody>
+                    <a:bodyPr/>
+                    <a:lstStyle/>
+                    <a:p>
+                      <a:pPr marL="0" marR="0" lvl="0" indent="0" algn="l" defTabSz="914400" rtl="0" eaLnBrk="1" fontAlgn="auto" latinLnBrk="0" hangingPunct="1">
+                        <a:lnSpc>
+                          <a:spcPct val="100000"/>
+                        </a:lnSpc>
+                        <a:spcBef>
+                          <a:spcPts val="0"/>
+                        </a:spcBef>
+                        <a:spcAft>
+                          <a:spcPts val="0"/>
+                        </a:spcAft>
+                        <a:buClrTx/>
+                        <a:buSzTx/>
+                        <a:buFontTx/>
+                        <a:buNone/>
+                        <a:tabLst/>
+                        <a:defRPr/>
+                      </a:pPr>
+                      <a:r>
+                        <a:rPr lang="fr-FR" sz="800" dirty="0"/>
+                        <a:t>{</a:t>
+                      </a:r>
+                      <a:r>
+                        <a:rPr lang="fr-FR" sz="800" dirty="0" err="1"/>
+                        <a:t>famille.chef.couple.prenom</a:t>
+                      </a:r>
+                      <a:r>
+                        <a:rPr lang="fr-FR" sz="800" dirty="0"/>
+                        <a:t>} ({</a:t>
+                      </a:r>
+                      <a:r>
+                        <a:rPr lang="fr-FR" sz="800" dirty="0" err="1"/>
+                        <a:t>famille.chef.couple.familleOrigine.nom</a:t>
+                      </a:r>
+                      <a:r>
+                        <a:rPr lang="fr-FR" sz="800" dirty="0"/>
+                        <a:t>}</a:t>
+                      </a:r>
+                    </a:p>
+                    <a:p>
+                      <a:pPr marL="0" marR="0" lvl="0" indent="0" algn="l" defTabSz="914400" rtl="0" eaLnBrk="1" fontAlgn="auto" latinLnBrk="0" hangingPunct="1">
+                        <a:lnSpc>
+                          <a:spcPct val="100000"/>
+                        </a:lnSpc>
+                        <a:spcBef>
+                          <a:spcPts val="0"/>
+                        </a:spcBef>
+                        <a:spcAft>
+                          <a:spcPts val="0"/>
+                        </a:spcAft>
+                        <a:buClrTx/>
+                        <a:buSzTx/>
+                        <a:buFontTx/>
+                        <a:buNone/>
+                        <a:tabLst/>
+                        <a:defRPr/>
+                      </a:pPr>
+                      <a:r>
+                        <a:rPr lang="fr-FR" sz="800" dirty="0"/>
+                        <a:t>) {</a:t>
+                      </a:r>
+                      <a:r>
+                        <a:rPr lang="fr-FR" sz="800" dirty="0" err="1"/>
+                        <a:t>famille.chef.couple.nom</a:t>
+                      </a:r>
+                      <a:r>
+                        <a:rPr lang="fr-FR" sz="800" dirty="0"/>
+                        <a:t>}</a:t>
+                      </a:r>
+                    </a:p>
+                  </a:txBody>
+                  <a:tcPr/>
+                </a:tc>
+                <a:extLst>
+                  <a:ext uri="{0D108BD9-81ED-4DB2-BD59-A6C34878D82A}">
+                    <a16:rowId xmlns:a16="http://schemas.microsoft.com/office/drawing/2014/main" val="1317625190"/>
+                  </a:ext>
+                </a:extLst>
+              </a:tr>
+            </a:tbl>
+          </a:graphicData>
+        </a:graphic>
+      </p:graphicFrame>
+      <p:sp>
+        <p:nvSpPr>
+          <p:cNvPr id="20" name="ZoneTexte 19">
+            <a:extLst>
+              <a:ext uri="{FF2B5EF4-FFF2-40B4-BE49-F238E27FC236}">
+                <a16:creationId xmlns:a16="http://schemas.microsoft.com/office/drawing/2014/main" id="{CD42B19B-E8EC-420A-845B-B33A0312150B}"/>
+              </a:ext>
+            </a:extLst>
+          </p:cNvPr>
+          <p:cNvSpPr txBox="1"/>
+          <p:nvPr/>
+        </p:nvSpPr>
+        <p:spPr>
+          <a:xfrm>
+            <a:off x="881832" y="4161753"/>
+            <a:ext cx="3240360" cy="400110"/>
+          </a:xfrm>
+          <a:prstGeom prst="rect">
+            <a:avLst/>
+          </a:prstGeom>
+          <a:noFill/>
+        </p:spPr>
+        <p:txBody>
+          <a:bodyPr wrap="square" rtlCol="0">
+            <a:spAutoFit/>
+          </a:bodyPr>
+          <a:lstStyle/>
+          <a:p>
+            <a:r>
+              <a:rPr lang="fr-FR" sz="1000" dirty="0"/>
+              <a:t>Tour en cours :</a:t>
+            </a:r>
+          </a:p>
+          <a:p>
+            <a:endParaRPr lang="fr-FR" sz="1000" dirty="0"/>
+          </a:p>
+        </p:txBody>
+      </p:sp>
+      <p:graphicFrame>
+        <p:nvGraphicFramePr>
+          <p:cNvPr id="21" name="Tableau 10">
+            <a:extLst>
+              <a:ext uri="{FF2B5EF4-FFF2-40B4-BE49-F238E27FC236}">
+                <a16:creationId xmlns:a16="http://schemas.microsoft.com/office/drawing/2014/main" id="{323633FE-FAA5-4997-88B2-C9DF2C0F8AC4}"/>
+              </a:ext>
+            </a:extLst>
+          </p:cNvPr>
+          <p:cNvGraphicFramePr>
+            <a:graphicFrameLocks noGrp="1"/>
+          </p:cNvGraphicFramePr>
+          <p:nvPr>
+            <p:extLst>
+              <p:ext uri="{D42A27DB-BD31-4B8C-83A1-F6EECF244321}">
+                <p14:modId xmlns:p14="http://schemas.microsoft.com/office/powerpoint/2010/main" val="1978905883"/>
+              </p:ext>
+            </p:extLst>
+          </p:nvPr>
+        </p:nvGraphicFramePr>
+        <p:xfrm>
+          <a:off x="1187624" y="4385508"/>
+          <a:ext cx="3060824" cy="762000"/>
+        </p:xfrm>
+        <a:graphic>
+          <a:graphicData uri="http://schemas.openxmlformats.org/drawingml/2006/table">
+            <a:tbl>
+              <a:tblPr firstRow="1" bandRow="1">
+                <a:tableStyleId>{5940675A-B579-460E-94D1-54222C63F5DA}</a:tableStyleId>
+              </a:tblPr>
+              <a:tblGrid>
+                <a:gridCol w="1530412">
+                  <a:extLst>
+                    <a:ext uri="{9D8B030D-6E8A-4147-A177-3AD203B41FA5}">
+                      <a16:colId xmlns:a16="http://schemas.microsoft.com/office/drawing/2014/main" val="3586916827"/>
+                    </a:ext>
+                  </a:extLst>
+                </a:gridCol>
+                <a:gridCol w="1530412">
+                  <a:extLst>
+                    <a:ext uri="{9D8B030D-6E8A-4147-A177-3AD203B41FA5}">
+                      <a16:colId xmlns:a16="http://schemas.microsoft.com/office/drawing/2014/main" val="1066306485"/>
+                    </a:ext>
+                  </a:extLst>
+                </a:gridCol>
+              </a:tblGrid>
+              <a:tr h="155504">
+                <a:tc>
+                  <a:txBody>
+                    <a:bodyPr/>
+                    <a:lstStyle/>
+                    <a:p>
+                      <a:r>
+                        <a:rPr lang="fr-FR" sz="800" dirty="0"/>
+                        <a:t>Numéro</a:t>
+                      </a:r>
+                    </a:p>
+                  </a:txBody>
+                  <a:tcPr/>
+                </a:tc>
+                <a:tc>
+                  <a:txBody>
+                    <a:bodyPr/>
+                    <a:lstStyle/>
+                    <a:p>
+                      <a:r>
+                        <a:rPr lang="fr-FR" sz="800" dirty="0"/>
+                        <a:t>{</a:t>
+                      </a:r>
+                      <a:r>
+                        <a:rPr lang="fr-FR" sz="800" dirty="0" err="1"/>
+                        <a:t>tour.nb</a:t>
+                      </a:r>
+                      <a:r>
+                        <a:rPr lang="fr-FR" sz="800" dirty="0"/>
+                        <a:t>}</a:t>
+                      </a:r>
+                    </a:p>
+                  </a:txBody>
+                  <a:tcPr/>
+                </a:tc>
+                <a:extLst>
+                  <a:ext uri="{0D108BD9-81ED-4DB2-BD59-A6C34878D82A}">
+                    <a16:rowId xmlns:a16="http://schemas.microsoft.com/office/drawing/2014/main" val="2540838935"/>
+                  </a:ext>
+                </a:extLst>
+              </a:tr>
+              <a:tr h="155504">
+                <a:tc>
+                  <a:txBody>
+                    <a:bodyPr/>
+                    <a:lstStyle/>
+                    <a:p>
+                      <a:r>
+                        <a:rPr lang="fr-FR" sz="800" dirty="0"/>
+                        <a:t>Semaine</a:t>
+                      </a:r>
+                    </a:p>
+                  </a:txBody>
+                  <a:tcPr/>
+                </a:tc>
+                <a:tc>
+                  <a:txBody>
+                    <a:bodyPr/>
+                    <a:lstStyle/>
+                    <a:p>
+                      <a:r>
+                        <a:rPr lang="fr-FR" sz="800" dirty="0"/>
+                        <a:t>{</a:t>
+                      </a:r>
+                      <a:r>
+                        <a:rPr lang="fr-FR" sz="800" dirty="0" err="1"/>
+                        <a:t>tour.semaine</a:t>
+                      </a:r>
+                      <a:r>
+                        <a:rPr lang="fr-FR" sz="800" dirty="0"/>
+                        <a:t>}</a:t>
+                      </a:r>
+                    </a:p>
+                  </a:txBody>
+                  <a:tcPr/>
+                </a:tc>
+                <a:extLst>
+                  <a:ext uri="{0D108BD9-81ED-4DB2-BD59-A6C34878D82A}">
+                    <a16:rowId xmlns:a16="http://schemas.microsoft.com/office/drawing/2014/main" val="469124120"/>
+                  </a:ext>
+                </a:extLst>
+              </a:tr>
+              <a:tr h="155504">
+                <a:tc>
+                  <a:txBody>
+                    <a:bodyPr/>
+                    <a:lstStyle/>
+                    <a:p>
+                      <a:r>
+                        <a:rPr lang="fr-FR" sz="800" dirty="0"/>
+                        <a:t>Argent In Game en début de tour</a:t>
+                      </a:r>
+                    </a:p>
+                  </a:txBody>
+                  <a:tcPr/>
+                </a:tc>
+                <a:tc>
+                  <a:txBody>
+                    <a:bodyPr/>
+                    <a:lstStyle/>
+                    <a:p>
+                      <a:r>
+                        <a:rPr lang="fr-FR" sz="800" dirty="0"/>
+                        <a:t>{</a:t>
+                      </a:r>
+                      <a:r>
+                        <a:rPr lang="fr-FR" sz="800" dirty="0" err="1"/>
+                        <a:t>tour.argentIg</a:t>
+                      </a:r>
+                      <a:r>
+                        <a:rPr lang="fr-FR" sz="800" dirty="0"/>
+                        <a:t>}</a:t>
+                      </a:r>
+                    </a:p>
+                  </a:txBody>
+                  <a:tcPr/>
+                </a:tc>
+                <a:extLst>
+                  <a:ext uri="{0D108BD9-81ED-4DB2-BD59-A6C34878D82A}">
+                    <a16:rowId xmlns:a16="http://schemas.microsoft.com/office/drawing/2014/main" val="3282643880"/>
+                  </a:ext>
+                </a:extLst>
+              </a:tr>
+            </a:tbl>
+          </a:graphicData>
+        </a:graphic>
+      </p:graphicFrame>
+    </p:spTree>
+    <p:extLst>
+      <p:ext uri="{BB962C8B-B14F-4D97-AF65-F5344CB8AC3E}">
+        <p14:creationId xmlns:p14="http://schemas.microsoft.com/office/powerpoint/2010/main" val="3006996470"/>
+      </p:ext>
+    </p:extLst>
+  </p:cSld>
+  <p:clrMapOvr>
+    <a:masterClrMapping/>
+  </p:clrMapOvr>
+</p:sld>
+</file>
+
+<file path=ppt/slides/slide6.xml><?xml version="1.0" encoding="utf-8"?>
+<p:sld xmlns:a="http://schemas.openxmlformats.org/drawingml/2006/main" xmlns:r="http://schemas.openxmlformats.org/officeDocument/2006/relationships" xmlns:p="http://schemas.openxmlformats.org/presentationml/2006/main">
+  <p:cSld>
+    <p:spTree>
+      <p:nvGrpSpPr>
+        <p:cNvPr id="1" name=""/>
+        <p:cNvGrpSpPr/>
+        <p:nvPr/>
+      </p:nvGrpSpPr>
+      <p:grpSpPr>
+        <a:xfrm>
+          <a:off x="0" y="0"/>
+          <a:ext cx="0" cy="0"/>
+          <a:chOff x="0" y="0"/>
+          <a:chExt cx="0" cy="0"/>
+        </a:xfrm>
+      </p:grpSpPr>
+      <p:graphicFrame>
+        <p:nvGraphicFramePr>
+          <p:cNvPr id="6" name="Tableau 5"/>
+          <p:cNvGraphicFramePr>
+            <a:graphicFrameLocks noGrp="1"/>
+          </p:cNvGraphicFramePr>
+          <p:nvPr/>
         </p:nvGraphicFramePr>
         <p:xfrm>
           <a:off x="4932040" y="1397000"/>
@@ -6950,13 +8245,7 @@
           <p:cNvGraphicFramePr>
             <a:graphicFrameLocks noGrp="1"/>
           </p:cNvGraphicFramePr>
-          <p:nvPr>
-            <p:extLst>
-              <p:ext uri="{D42A27DB-BD31-4B8C-83A1-F6EECF244321}">
-                <p14:modId xmlns:p14="http://schemas.microsoft.com/office/powerpoint/2010/main" val="1629675580"/>
-              </p:ext>
-            </p:extLst>
-          </p:nvPr>
+          <p:nvPr/>
         </p:nvGraphicFramePr>
         <p:xfrm>
           <a:off x="1115616" y="2153335"/>
@@ -7100,7 +8389,7 @@
     </p:spTree>
     <p:extLst>
       <p:ext uri="{BB962C8B-B14F-4D97-AF65-F5344CB8AC3E}">
-        <p14:creationId xmlns:p14="http://schemas.microsoft.com/office/powerpoint/2010/main" val="3006996470"/>
+        <p14:creationId xmlns:p14="http://schemas.microsoft.com/office/powerpoint/2010/main" val="1088709728"/>
       </p:ext>
     </p:extLst>
   </p:cSld>

</xml_diff>

<commit_message>
ajout classe et famille
</commit_message>
<xml_diff>
--- a/src/main/resources/mq.pptx
+++ b/src/main/resources/mq.pptx
@@ -307,7 +307,7 @@
           <a:p>
             <a:fld id="{1DDB72BE-B427-4A6F-AFFD-AFAC62060F46}" type="datetimeFigureOut">
               <a:rPr lang="fr-FR" smtClean="0"/>
-              <a:t>11/04/2020</a:t>
+              <a:t>19/05/2020</a:t>
             </a:fld>
             <a:endParaRPr lang="fr-FR"/>
           </a:p>
@@ -475,7 +475,7 @@
           <a:p>
             <a:fld id="{1DDB72BE-B427-4A6F-AFFD-AFAC62060F46}" type="datetimeFigureOut">
               <a:rPr lang="fr-FR" smtClean="0"/>
-              <a:t>11/04/2020</a:t>
+              <a:t>19/05/2020</a:t>
             </a:fld>
             <a:endParaRPr lang="fr-FR"/>
           </a:p>
@@ -653,7 +653,7 @@
           <a:p>
             <a:fld id="{1DDB72BE-B427-4A6F-AFFD-AFAC62060F46}" type="datetimeFigureOut">
               <a:rPr lang="fr-FR" smtClean="0"/>
-              <a:t>11/04/2020</a:t>
+              <a:t>19/05/2020</a:t>
             </a:fld>
             <a:endParaRPr lang="fr-FR"/>
           </a:p>
@@ -821,7 +821,7 @@
           <a:p>
             <a:fld id="{1DDB72BE-B427-4A6F-AFFD-AFAC62060F46}" type="datetimeFigureOut">
               <a:rPr lang="fr-FR" smtClean="0"/>
-              <a:t>11/04/2020</a:t>
+              <a:t>19/05/2020</a:t>
             </a:fld>
             <a:endParaRPr lang="fr-FR"/>
           </a:p>
@@ -1066,7 +1066,7 @@
           <a:p>
             <a:fld id="{1DDB72BE-B427-4A6F-AFFD-AFAC62060F46}" type="datetimeFigureOut">
               <a:rPr lang="fr-FR" smtClean="0"/>
-              <a:t>11/04/2020</a:t>
+              <a:t>19/05/2020</a:t>
             </a:fld>
             <a:endParaRPr lang="fr-FR"/>
           </a:p>
@@ -1351,7 +1351,7 @@
           <a:p>
             <a:fld id="{1DDB72BE-B427-4A6F-AFFD-AFAC62060F46}" type="datetimeFigureOut">
               <a:rPr lang="fr-FR" smtClean="0"/>
-              <a:t>11/04/2020</a:t>
+              <a:t>19/05/2020</a:t>
             </a:fld>
             <a:endParaRPr lang="fr-FR"/>
           </a:p>
@@ -1770,7 +1770,7 @@
           <a:p>
             <a:fld id="{1DDB72BE-B427-4A6F-AFFD-AFAC62060F46}" type="datetimeFigureOut">
               <a:rPr lang="fr-FR" smtClean="0"/>
-              <a:t>11/04/2020</a:t>
+              <a:t>19/05/2020</a:t>
             </a:fld>
             <a:endParaRPr lang="fr-FR"/>
           </a:p>
@@ -1887,7 +1887,7 @@
           <a:p>
             <a:fld id="{1DDB72BE-B427-4A6F-AFFD-AFAC62060F46}" type="datetimeFigureOut">
               <a:rPr lang="fr-FR" smtClean="0"/>
-              <a:t>11/04/2020</a:t>
+              <a:t>19/05/2020</a:t>
             </a:fld>
             <a:endParaRPr lang="fr-FR"/>
           </a:p>
@@ -1982,7 +1982,7 @@
           <a:p>
             <a:fld id="{1DDB72BE-B427-4A6F-AFFD-AFAC62060F46}" type="datetimeFigureOut">
               <a:rPr lang="fr-FR" smtClean="0"/>
-              <a:t>11/04/2020</a:t>
+              <a:t>19/05/2020</a:t>
             </a:fld>
             <a:endParaRPr lang="fr-FR"/>
           </a:p>
@@ -2257,7 +2257,7 @@
           <a:p>
             <a:fld id="{1DDB72BE-B427-4A6F-AFFD-AFAC62060F46}" type="datetimeFigureOut">
               <a:rPr lang="fr-FR" smtClean="0"/>
-              <a:t>11/04/2020</a:t>
+              <a:t>19/05/2020</a:t>
             </a:fld>
             <a:endParaRPr lang="fr-FR"/>
           </a:p>
@@ -2509,7 +2509,7 @@
           <a:p>
             <a:fld id="{1DDB72BE-B427-4A6F-AFFD-AFAC62060F46}" type="datetimeFigureOut">
               <a:rPr lang="fr-FR" smtClean="0"/>
-              <a:t>11/04/2020</a:t>
+              <a:t>19/05/2020</a:t>
             </a:fld>
             <a:endParaRPr lang="fr-FR"/>
           </a:p>
@@ -2720,7 +2720,7 @@
           <a:p>
             <a:fld id="{1DDB72BE-B427-4A6F-AFFD-AFAC62060F46}" type="datetimeFigureOut">
               <a:rPr lang="fr-FR" smtClean="0"/>
-              <a:t>11/04/2020</a:t>
+              <a:t>19/05/2020</a:t>
             </a:fld>
             <a:endParaRPr lang="fr-FR"/>
           </a:p>
@@ -6298,7 +6298,7 @@
           <p:nvPr>
             <p:extLst>
               <p:ext uri="{D42A27DB-BD31-4B8C-83A1-F6EECF244321}">
-                <p14:modId xmlns:p14="http://schemas.microsoft.com/office/powerpoint/2010/main" val="1411172186"/>
+                <p14:modId xmlns:p14="http://schemas.microsoft.com/office/powerpoint/2010/main" val="910547710"/>
               </p:ext>
             </p:extLst>
           </p:nvPr>
@@ -6388,17 +6388,23 @@
                     <a:bodyPr/>
                     <a:lstStyle/>
                     <a:p>
-                      <a:endParaRPr lang="fr-FR" sz="1200"/>
-                    </a:p>
-                  </a:txBody>
-                  <a:tcPr/>
-                </a:tc>
-                <a:tc>
-                  <a:txBody>
-                    <a:bodyPr/>
-                    <a:lstStyle/>
-                    <a:p>
-                      <a:endParaRPr lang="fr-FR" sz="1200"/>
+                      <a:r>
+                        <a:rPr lang="fr-FR" sz="1200" dirty="0"/>
+                        <a:t>V1.1</a:t>
+                      </a:r>
+                    </a:p>
+                  </a:txBody>
+                  <a:tcPr/>
+                </a:tc>
+                <a:tc>
+                  <a:txBody>
+                    <a:bodyPr/>
+                    <a:lstStyle/>
+                    <a:p>
+                      <a:r>
+                        <a:rPr lang="fr-FR" sz="1200" dirty="0"/>
+                        <a:t>T013 – Alimentation du champ classe</a:t>
+                      </a:r>
                     </a:p>
                   </a:txBody>
                   <a:tcPr/>
@@ -7035,7 +7041,7 @@
           <p:nvPr>
             <p:extLst>
               <p:ext uri="{D42A27DB-BD31-4B8C-83A1-F6EECF244321}">
-                <p14:modId xmlns:p14="http://schemas.microsoft.com/office/powerpoint/2010/main" val="514486159"/>
+                <p14:modId xmlns:p14="http://schemas.microsoft.com/office/powerpoint/2010/main" val="2014719976"/>
               </p:ext>
             </p:extLst>
           </p:nvPr>
@@ -7128,7 +7134,15 @@
                     <a:p>
                       <a:r>
                         <a:rPr lang="fr-FR" sz="800" dirty="0"/>
-                        <a:t>{vide}</a:t>
+                        <a:t>{</a:t>
+                      </a:r>
+                      <a:r>
+                        <a:rPr lang="fr-FR" sz="800" dirty="0" err="1"/>
+                        <a:t>famille.classe</a:t>
+                      </a:r>
+                      <a:r>
+                        <a:rPr lang="fr-FR" sz="800" dirty="0"/>
+                        <a:t>}</a:t>
                       </a:r>
                     </a:p>
                   </a:txBody>
@@ -7595,7 +7609,13 @@
           <p:cNvGraphicFramePr>
             <a:graphicFrameLocks noGrp="1"/>
           </p:cNvGraphicFramePr>
-          <p:nvPr/>
+          <p:nvPr>
+            <p:extLst>
+              <p:ext uri="{D42A27DB-BD31-4B8C-83A1-F6EECF244321}">
+                <p14:modId xmlns:p14="http://schemas.microsoft.com/office/powerpoint/2010/main" val="1841469757"/>
+              </p:ext>
+            </p:extLst>
+          </p:nvPr>
         </p:nvGraphicFramePr>
         <p:xfrm>
           <a:off x="4932040" y="1397000"/>
@@ -7682,17 +7702,23 @@
                     <a:bodyPr/>
                     <a:lstStyle/>
                     <a:p>
-                      <a:endParaRPr lang="fr-FR" sz="1200"/>
-                    </a:p>
-                  </a:txBody>
-                  <a:tcPr/>
-                </a:tc>
-                <a:tc>
-                  <a:txBody>
-                    <a:bodyPr/>
-                    <a:lstStyle/>
-                    <a:p>
-                      <a:endParaRPr lang="fr-FR" sz="1200"/>
+                      <a:r>
+                        <a:rPr lang="fr-FR" sz="1200" dirty="0"/>
+                        <a:t>V1.1</a:t>
+                      </a:r>
+                    </a:p>
+                  </a:txBody>
+                  <a:tcPr/>
+                </a:tc>
+                <a:tc>
+                  <a:txBody>
+                    <a:bodyPr/>
+                    <a:lstStyle/>
+                    <a:p>
+                      <a:r>
+                        <a:rPr lang="fr-FR" sz="1200" dirty="0"/>
+                        <a:t>T013 – Ajout de la colonne classe</a:t>
+                      </a:r>
                     </a:p>
                   </a:txBody>
                   <a:tcPr/>
@@ -8245,11 +8271,17 @@
           <p:cNvGraphicFramePr>
             <a:graphicFrameLocks noGrp="1"/>
           </p:cNvGraphicFramePr>
-          <p:nvPr/>
+          <p:nvPr>
+            <p:extLst>
+              <p:ext uri="{D42A27DB-BD31-4B8C-83A1-F6EECF244321}">
+                <p14:modId xmlns:p14="http://schemas.microsoft.com/office/powerpoint/2010/main" val="1670641809"/>
+              </p:ext>
+            </p:extLst>
+          </p:nvPr>
         </p:nvGraphicFramePr>
         <p:xfrm>
           <a:off x="1115616" y="2153335"/>
-          <a:ext cx="3312368" cy="213360"/>
+          <a:ext cx="3312370" cy="975360"/>
         </p:xfrm>
         <a:graphic>
           <a:graphicData uri="http://schemas.openxmlformats.org/drawingml/2006/table">
@@ -8258,28 +8290,35 @@
                 <a:tableStyleId>{5940675A-B579-460E-94D1-54222C63F5DA}</a:tableStyleId>
               </a:tblPr>
               <a:tblGrid>
-                <a:gridCol w="828092">
+                <a:gridCol w="662474">
                   <a:extLst>
                     <a:ext uri="{9D8B030D-6E8A-4147-A177-3AD203B41FA5}">
                       <a16:colId xmlns:a16="http://schemas.microsoft.com/office/drawing/2014/main" val="1107729764"/>
                     </a:ext>
                   </a:extLst>
                 </a:gridCol>
-                <a:gridCol w="828092">
+                <a:gridCol w="662474">
                   <a:extLst>
                     <a:ext uri="{9D8B030D-6E8A-4147-A177-3AD203B41FA5}">
                       <a16:colId xmlns:a16="http://schemas.microsoft.com/office/drawing/2014/main" val="1016315755"/>
                     </a:ext>
                   </a:extLst>
                 </a:gridCol>
-                <a:gridCol w="828092">
+                <a:gridCol w="662474">
                   <a:extLst>
                     <a:ext uri="{9D8B030D-6E8A-4147-A177-3AD203B41FA5}">
                       <a16:colId xmlns:a16="http://schemas.microsoft.com/office/drawing/2014/main" val="2123422907"/>
                     </a:ext>
                   </a:extLst>
                 </a:gridCol>
-                <a:gridCol w="828092">
+                <a:gridCol w="662474">
+                  <a:extLst>
+                    <a:ext uri="{9D8B030D-6E8A-4147-A177-3AD203B41FA5}">
+                      <a16:colId xmlns:a16="http://schemas.microsoft.com/office/drawing/2014/main" val="1356566472"/>
+                    </a:ext>
+                  </a:extLst>
+                </a:gridCol>
+                <a:gridCol w="662474">
                   <a:extLst>
                     <a:ext uri="{9D8B030D-6E8A-4147-A177-3AD203B41FA5}">
                       <a16:colId xmlns:a16="http://schemas.microsoft.com/office/drawing/2014/main" val="3886583170"/>
@@ -8334,6 +8373,19 @@
                     <a:p>
                       <a:r>
                         <a:rPr lang="fr-FR" sz="800" dirty="0"/>
+                        <a:t>Classe</a:t>
+                      </a:r>
+                    </a:p>
+                  </a:txBody>
+                  <a:tcPr/>
+                </a:tc>
+                <a:tc>
+                  <a:txBody>
+                    <a:bodyPr/>
+                    <a:lstStyle/>
+                    <a:p>
+                      <a:r>
+                        <a:rPr lang="fr-FR" sz="800" dirty="0"/>
                         <a:t>Chef de famille</a:t>
                       </a:r>
                     </a:p>
@@ -8343,6 +8395,177 @@
                 <a:extLst>
                   <a:ext uri="{0D108BD9-81ED-4DB2-BD59-A6C34878D82A}">
                     <a16:rowId xmlns:a16="http://schemas.microsoft.com/office/drawing/2014/main" val="1351064631"/>
+                  </a:ext>
+                </a:extLst>
+              </a:tr>
+              <a:tr h="193514">
+                <a:tc>
+                  <a:txBody>
+                    <a:bodyPr/>
+                    <a:lstStyle/>
+                    <a:p>
+                      <a:endParaRPr lang="fr-FR" sz="800" dirty="0"/>
+                    </a:p>
+                  </a:txBody>
+                  <a:tcPr/>
+                </a:tc>
+                <a:tc>
+                  <a:txBody>
+                    <a:bodyPr/>
+                    <a:lstStyle/>
+                    <a:p>
+                      <a:endParaRPr lang="fr-FR" sz="800" dirty="0"/>
+                    </a:p>
+                  </a:txBody>
+                  <a:tcPr/>
+                </a:tc>
+                <a:tc>
+                  <a:txBody>
+                    <a:bodyPr/>
+                    <a:lstStyle/>
+                    <a:p>
+                      <a:endParaRPr lang="fr-FR" sz="800" dirty="0"/>
+                    </a:p>
+                  </a:txBody>
+                  <a:tcPr/>
+                </a:tc>
+                <a:tc>
+                  <a:txBody>
+                    <a:bodyPr/>
+                    <a:lstStyle/>
+                    <a:p>
+                      <a:endParaRPr lang="fr-FR" sz="800" dirty="0"/>
+                    </a:p>
+                  </a:txBody>
+                  <a:tcPr/>
+                </a:tc>
+                <a:tc>
+                  <a:txBody>
+                    <a:bodyPr/>
+                    <a:lstStyle/>
+                    <a:p>
+                      <a:endParaRPr lang="fr-FR" sz="800" dirty="0"/>
+                    </a:p>
+                  </a:txBody>
+                  <a:tcPr/>
+                </a:tc>
+                <a:extLst>
+                  <a:ext uri="{0D108BD9-81ED-4DB2-BD59-A6C34878D82A}">
+                    <a16:rowId xmlns:a16="http://schemas.microsoft.com/office/drawing/2014/main" val="1525550748"/>
+                  </a:ext>
+                </a:extLst>
+              </a:tr>
+              <a:tr h="193514">
+                <a:tc>
+                  <a:txBody>
+                    <a:bodyPr/>
+                    <a:lstStyle/>
+                    <a:p>
+                      <a:endParaRPr lang="fr-FR" sz="800" dirty="0"/>
+                    </a:p>
+                  </a:txBody>
+                  <a:tcPr/>
+                </a:tc>
+                <a:tc>
+                  <a:txBody>
+                    <a:bodyPr/>
+                    <a:lstStyle/>
+                    <a:p>
+                      <a:endParaRPr lang="fr-FR" sz="800" dirty="0"/>
+                    </a:p>
+                  </a:txBody>
+                  <a:tcPr/>
+                </a:tc>
+                <a:tc>
+                  <a:txBody>
+                    <a:bodyPr/>
+                    <a:lstStyle/>
+                    <a:p>
+                      <a:endParaRPr lang="fr-FR" sz="800" dirty="0"/>
+                    </a:p>
+                  </a:txBody>
+                  <a:tcPr/>
+                </a:tc>
+                <a:tc>
+                  <a:txBody>
+                    <a:bodyPr/>
+                    <a:lstStyle/>
+                    <a:p>
+                      <a:endParaRPr lang="fr-FR" sz="800" dirty="0"/>
+                    </a:p>
+                  </a:txBody>
+                  <a:tcPr/>
+                </a:tc>
+                <a:tc>
+                  <a:txBody>
+                    <a:bodyPr/>
+                    <a:lstStyle/>
+                    <a:p>
+                      <a:endParaRPr lang="fr-FR" sz="800" dirty="0"/>
+                    </a:p>
+                  </a:txBody>
+                  <a:tcPr/>
+                </a:tc>
+                <a:extLst>
+                  <a:ext uri="{0D108BD9-81ED-4DB2-BD59-A6C34878D82A}">
+                    <a16:rowId xmlns:a16="http://schemas.microsoft.com/office/drawing/2014/main" val="995496648"/>
+                  </a:ext>
+                </a:extLst>
+              </a:tr>
+              <a:tr h="193514">
+                <a:tc>
+                  <a:txBody>
+                    <a:bodyPr/>
+                    <a:lstStyle/>
+                    <a:p>
+                      <a:endParaRPr lang="fr-FR" sz="800" dirty="0"/>
+                    </a:p>
+                  </a:txBody>
+                  <a:tcPr/>
+                </a:tc>
+                <a:tc>
+                  <a:txBody>
+                    <a:bodyPr/>
+                    <a:lstStyle/>
+                    <a:p>
+                      <a:endParaRPr lang="fr-FR" sz="800" dirty="0"/>
+                    </a:p>
+                  </a:txBody>
+                  <a:tcPr/>
+                </a:tc>
+                <a:tc>
+                  <a:txBody>
+                    <a:bodyPr/>
+                    <a:lstStyle/>
+                    <a:p>
+                      <a:endParaRPr lang="fr-FR" sz="800" dirty="0"/>
+                    </a:p>
+                  </a:txBody>
+                  <a:tcPr/>
+                </a:tc>
+                <a:tc>
+                  <a:txBody>
+                    <a:bodyPr/>
+                    <a:lstStyle/>
+                    <a:p>
+                      <a:endParaRPr lang="fr-FR" sz="800" dirty="0"/>
+                    </a:p>
+                  </a:txBody>
+                  <a:tcPr/>
+                </a:tc>
+                <a:tc>
+                  <a:txBody>
+                    <a:bodyPr/>
+                    <a:lstStyle/>
+                    <a:p>
+                      <a:endParaRPr lang="fr-FR" sz="800" dirty="0"/>
+                    </a:p>
+                  </a:txBody>
+                  <a:tcPr/>
+                </a:tc>
+                <a:extLst>
+                  <a:ext uri="{0D108BD9-81ED-4DB2-BD59-A6C34878D82A}">
+                    <a16:rowId xmlns:a16="http://schemas.microsoft.com/office/drawing/2014/main" val="1518828398"/>
                   </a:ext>
                 </a:extLst>
               </a:tr>

</xml_diff>